<commit_message>
worked on little bit more. shape and rotation info added (tBlocks.h/.cpp)
</commit_message>
<xml_diff>
--- a/Tetris_clone/rough_design.pptx
+++ b/Tetris_clone/rough_design.pptx
@@ -114,6 +114,11 @@
       </a:defRPr>
     </a:lvl9pPr>
   </p:defaultTextStyle>
+  <p:extLst>
+    <p:ext uri="{EFAFB233-063F-42B5-8137-9DF3F51BA10A}">
+      <p15:sldGuideLst xmlns:p15="http://schemas.microsoft.com/office/powerpoint/2012/main"/>
+    </p:ext>
+  </p:extLst>
 </p:presentation>
 </file>
 
@@ -159,10 +164,9 @@
           </a:lstStyle>
           <a:p>
             <a:r>
-              <a:rPr lang="ko-KR" altLang="en-US" smtClean="0"/>
+              <a:rPr lang="ko-KR" altLang="en-US"/>
               <a:t>마스터 제목 스타일 편집</a:t>
             </a:r>
-            <a:endParaRPr lang="ko-KR" altLang="en-US"/>
           </a:p>
         </p:txBody>
       </p:sp>
@@ -224,10 +228,9 @@
           </a:lstStyle>
           <a:p>
             <a:r>
-              <a:rPr lang="ko-KR" altLang="en-US" smtClean="0"/>
+              <a:rPr lang="ko-KR" altLang="en-US"/>
               <a:t>마스터 부제목 스타일 편집</a:t>
             </a:r>
-            <a:endParaRPr lang="ko-KR" altLang="en-US"/>
           </a:p>
         </p:txBody>
       </p:sp>
@@ -248,7 +251,7 @@
           <a:p>
             <a:fld id="{152ACF21-C8FE-46F8-9298-9BB7A44F066C}" type="datetimeFigureOut">
               <a:rPr lang="ko-KR" altLang="en-US" smtClean="0"/>
-              <a:t>2018-07-24</a:t>
+              <a:t>2018-07-25</a:t>
             </a:fld>
             <a:endParaRPr lang="ko-KR" altLang="en-US"/>
           </a:p>
@@ -342,10 +345,9 @@
           <a:lstStyle/>
           <a:p>
             <a:r>
-              <a:rPr lang="ko-KR" altLang="en-US" smtClean="0"/>
+              <a:rPr lang="ko-KR" altLang="en-US"/>
               <a:t>마스터 제목 스타일 편집</a:t>
             </a:r>
-            <a:endParaRPr lang="ko-KR" altLang="en-US"/>
           </a:p>
         </p:txBody>
       </p:sp>
@@ -366,38 +368,37 @@
           <a:p>
             <a:pPr lvl="0"/>
             <a:r>
-              <a:rPr lang="ko-KR" altLang="en-US" smtClean="0"/>
+              <a:rPr lang="ko-KR" altLang="en-US"/>
               <a:t>마스터 텍스트 스타일을 편집합니다</a:t>
             </a:r>
           </a:p>
           <a:p>
             <a:pPr lvl="1"/>
             <a:r>
-              <a:rPr lang="ko-KR" altLang="en-US" smtClean="0"/>
+              <a:rPr lang="ko-KR" altLang="en-US"/>
               <a:t>둘째 수준</a:t>
             </a:r>
           </a:p>
           <a:p>
             <a:pPr lvl="2"/>
             <a:r>
-              <a:rPr lang="ko-KR" altLang="en-US" smtClean="0"/>
+              <a:rPr lang="ko-KR" altLang="en-US"/>
               <a:t>셋째 수준</a:t>
             </a:r>
           </a:p>
           <a:p>
             <a:pPr lvl="3"/>
             <a:r>
-              <a:rPr lang="ko-KR" altLang="en-US" smtClean="0"/>
+              <a:rPr lang="ko-KR" altLang="en-US"/>
               <a:t>넷째 수준</a:t>
             </a:r>
           </a:p>
           <a:p>
             <a:pPr lvl="4"/>
             <a:r>
-              <a:rPr lang="ko-KR" altLang="en-US" smtClean="0"/>
+              <a:rPr lang="ko-KR" altLang="en-US"/>
               <a:t>다섯째 수준</a:t>
             </a:r>
-            <a:endParaRPr lang="ko-KR" altLang="en-US"/>
           </a:p>
         </p:txBody>
       </p:sp>
@@ -418,7 +419,7 @@
           <a:p>
             <a:fld id="{152ACF21-C8FE-46F8-9298-9BB7A44F066C}" type="datetimeFigureOut">
               <a:rPr lang="ko-KR" altLang="en-US" smtClean="0"/>
-              <a:t>2018-07-24</a:t>
+              <a:t>2018-07-25</a:t>
             </a:fld>
             <a:endParaRPr lang="ko-KR" altLang="en-US"/>
           </a:p>
@@ -517,10 +518,9 @@
           <a:lstStyle/>
           <a:p>
             <a:r>
-              <a:rPr lang="ko-KR" altLang="en-US" smtClean="0"/>
+              <a:rPr lang="ko-KR" altLang="en-US"/>
               <a:t>마스터 제목 스타일 편집</a:t>
             </a:r>
-            <a:endParaRPr lang="ko-KR" altLang="en-US"/>
           </a:p>
         </p:txBody>
       </p:sp>
@@ -546,38 +546,37 @@
           <a:p>
             <a:pPr lvl="0"/>
             <a:r>
-              <a:rPr lang="ko-KR" altLang="en-US" smtClean="0"/>
+              <a:rPr lang="ko-KR" altLang="en-US"/>
               <a:t>마스터 텍스트 스타일을 편집합니다</a:t>
             </a:r>
           </a:p>
           <a:p>
             <a:pPr lvl="1"/>
             <a:r>
-              <a:rPr lang="ko-KR" altLang="en-US" smtClean="0"/>
+              <a:rPr lang="ko-KR" altLang="en-US"/>
               <a:t>둘째 수준</a:t>
             </a:r>
           </a:p>
           <a:p>
             <a:pPr lvl="2"/>
             <a:r>
-              <a:rPr lang="ko-KR" altLang="en-US" smtClean="0"/>
+              <a:rPr lang="ko-KR" altLang="en-US"/>
               <a:t>셋째 수준</a:t>
             </a:r>
           </a:p>
           <a:p>
             <a:pPr lvl="3"/>
             <a:r>
-              <a:rPr lang="ko-KR" altLang="en-US" smtClean="0"/>
+              <a:rPr lang="ko-KR" altLang="en-US"/>
               <a:t>넷째 수준</a:t>
             </a:r>
           </a:p>
           <a:p>
             <a:pPr lvl="4"/>
             <a:r>
-              <a:rPr lang="ko-KR" altLang="en-US" smtClean="0"/>
+              <a:rPr lang="ko-KR" altLang="en-US"/>
               <a:t>다섯째 수준</a:t>
             </a:r>
-            <a:endParaRPr lang="ko-KR" altLang="en-US"/>
           </a:p>
         </p:txBody>
       </p:sp>
@@ -598,7 +597,7 @@
           <a:p>
             <a:fld id="{152ACF21-C8FE-46F8-9298-9BB7A44F066C}" type="datetimeFigureOut">
               <a:rPr lang="ko-KR" altLang="en-US" smtClean="0"/>
-              <a:t>2018-07-24</a:t>
+              <a:t>2018-07-25</a:t>
             </a:fld>
             <a:endParaRPr lang="ko-KR" altLang="en-US"/>
           </a:p>
@@ -692,10 +691,9 @@
           <a:lstStyle/>
           <a:p>
             <a:r>
-              <a:rPr lang="ko-KR" altLang="en-US" smtClean="0"/>
+              <a:rPr lang="ko-KR" altLang="en-US"/>
               <a:t>마스터 제목 스타일 편집</a:t>
             </a:r>
-            <a:endParaRPr lang="ko-KR" altLang="en-US"/>
           </a:p>
         </p:txBody>
       </p:sp>
@@ -716,38 +714,37 @@
           <a:p>
             <a:pPr lvl="0"/>
             <a:r>
-              <a:rPr lang="ko-KR" altLang="en-US" smtClean="0"/>
+              <a:rPr lang="ko-KR" altLang="en-US"/>
               <a:t>마스터 텍스트 스타일을 편집합니다</a:t>
             </a:r>
           </a:p>
           <a:p>
             <a:pPr lvl="1"/>
             <a:r>
-              <a:rPr lang="ko-KR" altLang="en-US" smtClean="0"/>
+              <a:rPr lang="ko-KR" altLang="en-US"/>
               <a:t>둘째 수준</a:t>
             </a:r>
           </a:p>
           <a:p>
             <a:pPr lvl="2"/>
             <a:r>
-              <a:rPr lang="ko-KR" altLang="en-US" smtClean="0"/>
+              <a:rPr lang="ko-KR" altLang="en-US"/>
               <a:t>셋째 수준</a:t>
             </a:r>
           </a:p>
           <a:p>
             <a:pPr lvl="3"/>
             <a:r>
-              <a:rPr lang="ko-KR" altLang="en-US" smtClean="0"/>
+              <a:rPr lang="ko-KR" altLang="en-US"/>
               <a:t>넷째 수준</a:t>
             </a:r>
           </a:p>
           <a:p>
             <a:pPr lvl="4"/>
             <a:r>
-              <a:rPr lang="ko-KR" altLang="en-US" smtClean="0"/>
+              <a:rPr lang="ko-KR" altLang="en-US"/>
               <a:t>다섯째 수준</a:t>
             </a:r>
-            <a:endParaRPr lang="ko-KR" altLang="en-US"/>
           </a:p>
         </p:txBody>
       </p:sp>
@@ -768,7 +765,7 @@
           <a:p>
             <a:fld id="{152ACF21-C8FE-46F8-9298-9BB7A44F066C}" type="datetimeFigureOut">
               <a:rPr lang="ko-KR" altLang="en-US" smtClean="0"/>
-              <a:t>2018-07-24</a:t>
+              <a:t>2018-07-25</a:t>
             </a:fld>
             <a:endParaRPr lang="ko-KR" altLang="en-US"/>
           </a:p>
@@ -871,10 +868,9 @@
           </a:lstStyle>
           <a:p>
             <a:r>
-              <a:rPr lang="ko-KR" altLang="en-US" smtClean="0"/>
+              <a:rPr lang="ko-KR" altLang="en-US"/>
               <a:t>마스터 제목 스타일 편집</a:t>
             </a:r>
-            <a:endParaRPr lang="ko-KR" altLang="en-US"/>
           </a:p>
         </p:txBody>
       </p:sp>
@@ -991,7 +987,7 @@
           <a:p>
             <a:pPr lvl="0"/>
             <a:r>
-              <a:rPr lang="ko-KR" altLang="en-US" smtClean="0"/>
+              <a:rPr lang="ko-KR" altLang="en-US"/>
               <a:t>마스터 텍스트 스타일을 편집합니다</a:t>
             </a:r>
           </a:p>
@@ -1014,7 +1010,7 @@
           <a:p>
             <a:fld id="{152ACF21-C8FE-46F8-9298-9BB7A44F066C}" type="datetimeFigureOut">
               <a:rPr lang="ko-KR" altLang="en-US" smtClean="0"/>
-              <a:t>2018-07-24</a:t>
+              <a:t>2018-07-25</a:t>
             </a:fld>
             <a:endParaRPr lang="ko-KR" altLang="en-US"/>
           </a:p>
@@ -1108,10 +1104,9 @@
           <a:lstStyle/>
           <a:p>
             <a:r>
-              <a:rPr lang="ko-KR" altLang="en-US" smtClean="0"/>
+              <a:rPr lang="ko-KR" altLang="en-US"/>
               <a:t>마스터 제목 스타일 편집</a:t>
             </a:r>
-            <a:endParaRPr lang="ko-KR" altLang="en-US"/>
           </a:p>
         </p:txBody>
       </p:sp>
@@ -1137,38 +1132,37 @@
           <a:p>
             <a:pPr lvl="0"/>
             <a:r>
-              <a:rPr lang="ko-KR" altLang="en-US" smtClean="0"/>
+              <a:rPr lang="ko-KR" altLang="en-US"/>
               <a:t>마스터 텍스트 스타일을 편집합니다</a:t>
             </a:r>
           </a:p>
           <a:p>
             <a:pPr lvl="1"/>
             <a:r>
-              <a:rPr lang="ko-KR" altLang="en-US" smtClean="0"/>
+              <a:rPr lang="ko-KR" altLang="en-US"/>
               <a:t>둘째 수준</a:t>
             </a:r>
           </a:p>
           <a:p>
             <a:pPr lvl="2"/>
             <a:r>
-              <a:rPr lang="ko-KR" altLang="en-US" smtClean="0"/>
+              <a:rPr lang="ko-KR" altLang="en-US"/>
               <a:t>셋째 수준</a:t>
             </a:r>
           </a:p>
           <a:p>
             <a:pPr lvl="3"/>
             <a:r>
-              <a:rPr lang="ko-KR" altLang="en-US" smtClean="0"/>
+              <a:rPr lang="ko-KR" altLang="en-US"/>
               <a:t>넷째 수준</a:t>
             </a:r>
           </a:p>
           <a:p>
             <a:pPr lvl="4"/>
             <a:r>
-              <a:rPr lang="ko-KR" altLang="en-US" smtClean="0"/>
+              <a:rPr lang="ko-KR" altLang="en-US"/>
               <a:t>다섯째 수준</a:t>
             </a:r>
-            <a:endParaRPr lang="ko-KR" altLang="en-US"/>
           </a:p>
         </p:txBody>
       </p:sp>
@@ -1194,38 +1188,37 @@
           <a:p>
             <a:pPr lvl="0"/>
             <a:r>
-              <a:rPr lang="ko-KR" altLang="en-US" smtClean="0"/>
+              <a:rPr lang="ko-KR" altLang="en-US"/>
               <a:t>마스터 텍스트 스타일을 편집합니다</a:t>
             </a:r>
           </a:p>
           <a:p>
             <a:pPr lvl="1"/>
             <a:r>
-              <a:rPr lang="ko-KR" altLang="en-US" smtClean="0"/>
+              <a:rPr lang="ko-KR" altLang="en-US"/>
               <a:t>둘째 수준</a:t>
             </a:r>
           </a:p>
           <a:p>
             <a:pPr lvl="2"/>
             <a:r>
-              <a:rPr lang="ko-KR" altLang="en-US" smtClean="0"/>
+              <a:rPr lang="ko-KR" altLang="en-US"/>
               <a:t>셋째 수준</a:t>
             </a:r>
           </a:p>
           <a:p>
             <a:pPr lvl="3"/>
             <a:r>
-              <a:rPr lang="ko-KR" altLang="en-US" smtClean="0"/>
+              <a:rPr lang="ko-KR" altLang="en-US"/>
               <a:t>넷째 수준</a:t>
             </a:r>
           </a:p>
           <a:p>
             <a:pPr lvl="4"/>
             <a:r>
-              <a:rPr lang="ko-KR" altLang="en-US" smtClean="0"/>
+              <a:rPr lang="ko-KR" altLang="en-US"/>
               <a:t>다섯째 수준</a:t>
             </a:r>
-            <a:endParaRPr lang="ko-KR" altLang="en-US"/>
           </a:p>
         </p:txBody>
       </p:sp>
@@ -1246,7 +1239,7 @@
           <a:p>
             <a:fld id="{152ACF21-C8FE-46F8-9298-9BB7A44F066C}" type="datetimeFigureOut">
               <a:rPr lang="ko-KR" altLang="en-US" smtClean="0"/>
-              <a:t>2018-07-24</a:t>
+              <a:t>2018-07-25</a:t>
             </a:fld>
             <a:endParaRPr lang="ko-KR" altLang="en-US"/>
           </a:p>
@@ -1345,10 +1338,9 @@
           <a:lstStyle/>
           <a:p>
             <a:r>
-              <a:rPr lang="ko-KR" altLang="en-US" smtClean="0"/>
+              <a:rPr lang="ko-KR" altLang="en-US"/>
               <a:t>마스터 제목 스타일 편집</a:t>
             </a:r>
-            <a:endParaRPr lang="ko-KR" altLang="en-US"/>
           </a:p>
         </p:txBody>
       </p:sp>
@@ -1411,7 +1403,7 @@
           <a:p>
             <a:pPr lvl="0"/>
             <a:r>
-              <a:rPr lang="ko-KR" altLang="en-US" smtClean="0"/>
+              <a:rPr lang="ko-KR" altLang="en-US"/>
               <a:t>마스터 텍스트 스타일을 편집합니다</a:t>
             </a:r>
           </a:p>
@@ -1439,38 +1431,37 @@
           <a:p>
             <a:pPr lvl="0"/>
             <a:r>
-              <a:rPr lang="ko-KR" altLang="en-US" smtClean="0"/>
+              <a:rPr lang="ko-KR" altLang="en-US"/>
               <a:t>마스터 텍스트 스타일을 편집합니다</a:t>
             </a:r>
           </a:p>
           <a:p>
             <a:pPr lvl="1"/>
             <a:r>
-              <a:rPr lang="ko-KR" altLang="en-US" smtClean="0"/>
+              <a:rPr lang="ko-KR" altLang="en-US"/>
               <a:t>둘째 수준</a:t>
             </a:r>
           </a:p>
           <a:p>
             <a:pPr lvl="2"/>
             <a:r>
-              <a:rPr lang="ko-KR" altLang="en-US" smtClean="0"/>
+              <a:rPr lang="ko-KR" altLang="en-US"/>
               <a:t>셋째 수준</a:t>
             </a:r>
           </a:p>
           <a:p>
             <a:pPr lvl="3"/>
             <a:r>
-              <a:rPr lang="ko-KR" altLang="en-US" smtClean="0"/>
+              <a:rPr lang="ko-KR" altLang="en-US"/>
               <a:t>넷째 수준</a:t>
             </a:r>
           </a:p>
           <a:p>
             <a:pPr lvl="4"/>
             <a:r>
-              <a:rPr lang="ko-KR" altLang="en-US" smtClean="0"/>
+              <a:rPr lang="ko-KR" altLang="en-US"/>
               <a:t>다섯째 수준</a:t>
             </a:r>
-            <a:endParaRPr lang="ko-KR" altLang="en-US"/>
           </a:p>
         </p:txBody>
       </p:sp>
@@ -1533,7 +1524,7 @@
           <a:p>
             <a:pPr lvl="0"/>
             <a:r>
-              <a:rPr lang="ko-KR" altLang="en-US" smtClean="0"/>
+              <a:rPr lang="ko-KR" altLang="en-US"/>
               <a:t>마스터 텍스트 스타일을 편집합니다</a:t>
             </a:r>
           </a:p>
@@ -1561,38 +1552,37 @@
           <a:p>
             <a:pPr lvl="0"/>
             <a:r>
-              <a:rPr lang="ko-KR" altLang="en-US" smtClean="0"/>
+              <a:rPr lang="ko-KR" altLang="en-US"/>
               <a:t>마스터 텍스트 스타일을 편집합니다</a:t>
             </a:r>
           </a:p>
           <a:p>
             <a:pPr lvl="1"/>
             <a:r>
-              <a:rPr lang="ko-KR" altLang="en-US" smtClean="0"/>
+              <a:rPr lang="ko-KR" altLang="en-US"/>
               <a:t>둘째 수준</a:t>
             </a:r>
           </a:p>
           <a:p>
             <a:pPr lvl="2"/>
             <a:r>
-              <a:rPr lang="ko-KR" altLang="en-US" smtClean="0"/>
+              <a:rPr lang="ko-KR" altLang="en-US"/>
               <a:t>셋째 수준</a:t>
             </a:r>
           </a:p>
           <a:p>
             <a:pPr lvl="3"/>
             <a:r>
-              <a:rPr lang="ko-KR" altLang="en-US" smtClean="0"/>
+              <a:rPr lang="ko-KR" altLang="en-US"/>
               <a:t>넷째 수준</a:t>
             </a:r>
           </a:p>
           <a:p>
             <a:pPr lvl="4"/>
             <a:r>
-              <a:rPr lang="ko-KR" altLang="en-US" smtClean="0"/>
+              <a:rPr lang="ko-KR" altLang="en-US"/>
               <a:t>다섯째 수준</a:t>
             </a:r>
-            <a:endParaRPr lang="ko-KR" altLang="en-US"/>
           </a:p>
         </p:txBody>
       </p:sp>
@@ -1613,7 +1603,7 @@
           <a:p>
             <a:fld id="{152ACF21-C8FE-46F8-9298-9BB7A44F066C}" type="datetimeFigureOut">
               <a:rPr lang="ko-KR" altLang="en-US" smtClean="0"/>
-              <a:t>2018-07-24</a:t>
+              <a:t>2018-07-25</a:t>
             </a:fld>
             <a:endParaRPr lang="ko-KR" altLang="en-US"/>
           </a:p>
@@ -1707,10 +1697,9 @@
           <a:lstStyle/>
           <a:p>
             <a:r>
-              <a:rPr lang="ko-KR" altLang="en-US" smtClean="0"/>
+              <a:rPr lang="ko-KR" altLang="en-US"/>
               <a:t>마스터 제목 스타일 편집</a:t>
             </a:r>
-            <a:endParaRPr lang="ko-KR" altLang="en-US"/>
           </a:p>
         </p:txBody>
       </p:sp>
@@ -1731,7 +1720,7 @@
           <a:p>
             <a:fld id="{152ACF21-C8FE-46F8-9298-9BB7A44F066C}" type="datetimeFigureOut">
               <a:rPr lang="ko-KR" altLang="en-US" smtClean="0"/>
-              <a:t>2018-07-24</a:t>
+              <a:t>2018-07-25</a:t>
             </a:fld>
             <a:endParaRPr lang="ko-KR" altLang="en-US"/>
           </a:p>
@@ -1826,7 +1815,7 @@
           <a:p>
             <a:fld id="{152ACF21-C8FE-46F8-9298-9BB7A44F066C}" type="datetimeFigureOut">
               <a:rPr lang="ko-KR" altLang="en-US" smtClean="0"/>
-              <a:t>2018-07-24</a:t>
+              <a:t>2018-07-25</a:t>
             </a:fld>
             <a:endParaRPr lang="ko-KR" altLang="en-US"/>
           </a:p>
@@ -1929,10 +1918,9 @@
           </a:lstStyle>
           <a:p>
             <a:r>
-              <a:rPr lang="ko-KR" altLang="en-US" smtClean="0"/>
+              <a:rPr lang="ko-KR" altLang="en-US"/>
               <a:t>마스터 제목 스타일 편집</a:t>
             </a:r>
-            <a:endParaRPr lang="ko-KR" altLang="en-US"/>
           </a:p>
         </p:txBody>
       </p:sp>
@@ -1986,38 +1974,37 @@
           <a:p>
             <a:pPr lvl="0"/>
             <a:r>
-              <a:rPr lang="ko-KR" altLang="en-US" smtClean="0"/>
+              <a:rPr lang="ko-KR" altLang="en-US"/>
               <a:t>마스터 텍스트 스타일을 편집합니다</a:t>
             </a:r>
           </a:p>
           <a:p>
             <a:pPr lvl="1"/>
             <a:r>
-              <a:rPr lang="ko-KR" altLang="en-US" smtClean="0"/>
+              <a:rPr lang="ko-KR" altLang="en-US"/>
               <a:t>둘째 수준</a:t>
             </a:r>
           </a:p>
           <a:p>
             <a:pPr lvl="2"/>
             <a:r>
-              <a:rPr lang="ko-KR" altLang="en-US" smtClean="0"/>
+              <a:rPr lang="ko-KR" altLang="en-US"/>
               <a:t>셋째 수준</a:t>
             </a:r>
           </a:p>
           <a:p>
             <a:pPr lvl="3"/>
             <a:r>
-              <a:rPr lang="ko-KR" altLang="en-US" smtClean="0"/>
+              <a:rPr lang="ko-KR" altLang="en-US"/>
               <a:t>넷째 수준</a:t>
             </a:r>
           </a:p>
           <a:p>
             <a:pPr lvl="4"/>
             <a:r>
-              <a:rPr lang="ko-KR" altLang="en-US" smtClean="0"/>
+              <a:rPr lang="ko-KR" altLang="en-US"/>
               <a:t>다섯째 수준</a:t>
             </a:r>
-            <a:endParaRPr lang="ko-KR" altLang="en-US"/>
           </a:p>
         </p:txBody>
       </p:sp>
@@ -2080,7 +2067,7 @@
           <a:p>
             <a:pPr lvl="0"/>
             <a:r>
-              <a:rPr lang="ko-KR" altLang="en-US" smtClean="0"/>
+              <a:rPr lang="ko-KR" altLang="en-US"/>
               <a:t>마스터 텍스트 스타일을 편집합니다</a:t>
             </a:r>
           </a:p>
@@ -2103,7 +2090,7 @@
           <a:p>
             <a:fld id="{152ACF21-C8FE-46F8-9298-9BB7A44F066C}" type="datetimeFigureOut">
               <a:rPr lang="ko-KR" altLang="en-US" smtClean="0"/>
-              <a:t>2018-07-24</a:t>
+              <a:t>2018-07-25</a:t>
             </a:fld>
             <a:endParaRPr lang="ko-KR" altLang="en-US"/>
           </a:p>
@@ -2206,10 +2193,9 @@
           </a:lstStyle>
           <a:p>
             <a:r>
-              <a:rPr lang="ko-KR" altLang="en-US" smtClean="0"/>
+              <a:rPr lang="ko-KR" altLang="en-US"/>
               <a:t>마스터 제목 스타일 편집</a:t>
             </a:r>
-            <a:endParaRPr lang="ko-KR" altLang="en-US"/>
           </a:p>
         </p:txBody>
       </p:sp>
@@ -2333,7 +2319,7 @@
           <a:p>
             <a:pPr lvl="0"/>
             <a:r>
-              <a:rPr lang="ko-KR" altLang="en-US" smtClean="0"/>
+              <a:rPr lang="ko-KR" altLang="en-US"/>
               <a:t>마스터 텍스트 스타일을 편집합니다</a:t>
             </a:r>
           </a:p>
@@ -2356,7 +2342,7 @@
           <a:p>
             <a:fld id="{152ACF21-C8FE-46F8-9298-9BB7A44F066C}" type="datetimeFigureOut">
               <a:rPr lang="ko-KR" altLang="en-US" smtClean="0"/>
-              <a:t>2018-07-24</a:t>
+              <a:t>2018-07-25</a:t>
             </a:fld>
             <a:endParaRPr lang="ko-KR" altLang="en-US"/>
           </a:p>
@@ -2465,10 +2451,9 @@
           <a:lstStyle/>
           <a:p>
             <a:r>
-              <a:rPr lang="ko-KR" altLang="en-US" smtClean="0"/>
+              <a:rPr lang="ko-KR" altLang="en-US"/>
               <a:t>마스터 제목 스타일 편집</a:t>
             </a:r>
-            <a:endParaRPr lang="ko-KR" altLang="en-US"/>
           </a:p>
         </p:txBody>
       </p:sp>
@@ -2499,38 +2484,37 @@
           <a:p>
             <a:pPr lvl="0"/>
             <a:r>
-              <a:rPr lang="ko-KR" altLang="en-US" smtClean="0"/>
+              <a:rPr lang="ko-KR" altLang="en-US"/>
               <a:t>마스터 텍스트 스타일을 편집합니다</a:t>
             </a:r>
           </a:p>
           <a:p>
             <a:pPr lvl="1"/>
             <a:r>
-              <a:rPr lang="ko-KR" altLang="en-US" smtClean="0"/>
+              <a:rPr lang="ko-KR" altLang="en-US"/>
               <a:t>둘째 수준</a:t>
             </a:r>
           </a:p>
           <a:p>
             <a:pPr lvl="2"/>
             <a:r>
-              <a:rPr lang="ko-KR" altLang="en-US" smtClean="0"/>
+              <a:rPr lang="ko-KR" altLang="en-US"/>
               <a:t>셋째 수준</a:t>
             </a:r>
           </a:p>
           <a:p>
             <a:pPr lvl="3"/>
             <a:r>
-              <a:rPr lang="ko-KR" altLang="en-US" smtClean="0"/>
+              <a:rPr lang="ko-KR" altLang="en-US"/>
               <a:t>넷째 수준</a:t>
             </a:r>
           </a:p>
           <a:p>
             <a:pPr lvl="4"/>
             <a:r>
-              <a:rPr lang="ko-KR" altLang="en-US" smtClean="0"/>
+              <a:rPr lang="ko-KR" altLang="en-US"/>
               <a:t>다섯째 수준</a:t>
             </a:r>
-            <a:endParaRPr lang="ko-KR" altLang="en-US"/>
           </a:p>
         </p:txBody>
       </p:sp>
@@ -2569,7 +2553,7 @@
           <a:p>
             <a:fld id="{152ACF21-C8FE-46F8-9298-9BB7A44F066C}" type="datetimeFigureOut">
               <a:rPr lang="ko-KR" altLang="en-US" smtClean="0"/>
-              <a:t>2018-07-24</a:t>
+              <a:t>2018-07-25</a:t>
             </a:fld>
             <a:endParaRPr lang="ko-KR" altLang="en-US"/>
           </a:p>
@@ -2997,22 +2981,21 @@
           <a:lstStyle/>
           <a:p>
             <a:r>
-              <a:rPr lang="ko-KR" altLang="en-US" err="1" smtClean="0"/>
+              <a:rPr lang="ko-KR" altLang="en-US" err="1"/>
               <a:t>테트리스</a:t>
             </a:r>
             <a:r>
-              <a:rPr lang="ko-KR" altLang="en-US" dirty="0" smtClean="0"/>
+              <a:rPr lang="ko-KR" altLang="en-US" dirty="0"/>
               <a:t> </a:t>
             </a:r>
             <a:r>
-              <a:rPr lang="ko-KR" altLang="en-US" dirty="0" err="1" smtClean="0"/>
+              <a:rPr lang="ko-KR" altLang="en-US" dirty="0" err="1"/>
               <a:t>간략</a:t>
             </a:r>
             <a:r>
-              <a:rPr lang="ko-KR" altLang="en-US" dirty="0" smtClean="0"/>
+              <a:rPr lang="ko-KR" altLang="en-US" dirty="0"/>
               <a:t> 설계</a:t>
             </a:r>
-            <a:endParaRPr lang="ko-KR" altLang="en-US" dirty="0"/>
           </a:p>
         </p:txBody>
       </p:sp>
@@ -3094,14 +3077,13 @@
           <a:p>
             <a:pPr algn="ctr"/>
             <a:r>
-              <a:rPr lang="ko-KR" altLang="en-US" b="1" dirty="0" err="1" smtClean="0"/>
+              <a:rPr lang="ko-KR" altLang="en-US" b="1" dirty="0" err="1"/>
               <a:t>테트리스</a:t>
             </a:r>
             <a:r>
-              <a:rPr lang="ko-KR" altLang="en-US" b="1" dirty="0" smtClean="0"/>
+              <a:rPr lang="ko-KR" altLang="en-US" b="1" dirty="0"/>
               <a:t> 게임</a:t>
             </a:r>
-            <a:endParaRPr lang="ko-KR" altLang="en-US" b="1" dirty="0"/>
           </a:p>
         </p:txBody>
       </p:sp>
@@ -3128,196 +3110,196 @@
           <a:lstStyle/>
           <a:p>
             <a:r>
-              <a:rPr lang="en-US" altLang="ko-KR" sz="1200" dirty="0" smtClean="0"/>
+              <a:rPr lang="en-US" altLang="ko-KR" sz="1200" dirty="0"/>
               <a:t>1. </a:t>
             </a:r>
             <a:r>
-              <a:rPr lang="ko-KR" altLang="en-US" sz="1200" dirty="0" smtClean="0"/>
+              <a:rPr lang="ko-KR" altLang="en-US" sz="1200" dirty="0"/>
               <a:t>게임 실행</a:t>
             </a:r>
-            <a:endParaRPr lang="en-US" altLang="ko-KR" sz="1200" dirty="0" smtClean="0"/>
-          </a:p>
-          <a:p>
-            <a:r>
-              <a:rPr lang="en-US" altLang="ko-KR" sz="1200" dirty="0" smtClean="0"/>
+            <a:endParaRPr lang="en-US" altLang="ko-KR" sz="1200" dirty="0"/>
+          </a:p>
+          <a:p>
+            <a:r>
+              <a:rPr lang="en-US" altLang="ko-KR" sz="1200" dirty="0"/>
               <a:t>2. </a:t>
             </a:r>
             <a:r>
-              <a:rPr lang="ko-KR" altLang="en-US" sz="1200" dirty="0" smtClean="0"/>
+              <a:rPr lang="ko-KR" altLang="en-US" sz="1200" dirty="0"/>
               <a:t>타이틀 화면</a:t>
             </a:r>
-            <a:endParaRPr lang="en-US" altLang="ko-KR" sz="1200" dirty="0" smtClean="0"/>
-          </a:p>
-          <a:p>
-            <a:r>
-              <a:rPr lang="en-US" altLang="ko-KR" sz="1200" dirty="0" smtClean="0"/>
+            <a:endParaRPr lang="en-US" altLang="ko-KR" sz="1200" dirty="0"/>
+          </a:p>
+          <a:p>
+            <a:r>
+              <a:rPr lang="en-US" altLang="ko-KR" sz="1200" dirty="0"/>
               <a:t>3. </a:t>
             </a:r>
             <a:r>
-              <a:rPr lang="ko-KR" altLang="en-US" sz="1200" dirty="0" smtClean="0"/>
+              <a:rPr lang="ko-KR" altLang="en-US" sz="1200" dirty="0"/>
               <a:t>플레이 선택</a:t>
             </a:r>
-            <a:endParaRPr lang="en-US" altLang="ko-KR" sz="1200" dirty="0" smtClean="0"/>
-          </a:p>
-          <a:p>
-            <a:r>
-              <a:rPr lang="en-US" altLang="ko-KR" sz="1200" dirty="0" smtClean="0"/>
+            <a:endParaRPr lang="en-US" altLang="ko-KR" sz="1200" dirty="0"/>
+          </a:p>
+          <a:p>
+            <a:r>
+              <a:rPr lang="en-US" altLang="ko-KR" sz="1200" dirty="0"/>
               <a:t>3-1. </a:t>
             </a:r>
             <a:r>
-              <a:rPr lang="ko-KR" altLang="en-US" sz="1200" dirty="0" smtClean="0"/>
+              <a:rPr lang="ko-KR" altLang="en-US" sz="1200" dirty="0"/>
               <a:t>스테이지 </a:t>
             </a:r>
             <a:r>
-              <a:rPr lang="en-US" altLang="ko-KR" sz="1200" dirty="0" smtClean="0"/>
+              <a:rPr lang="en-US" altLang="ko-KR" sz="1200" dirty="0"/>
               <a:t>1</a:t>
             </a:r>
             <a:r>
-              <a:rPr lang="ko-KR" altLang="en-US" sz="1200" dirty="0" smtClean="0"/>
+              <a:rPr lang="ko-KR" altLang="en-US" sz="1200" dirty="0"/>
               <a:t>부터 시작</a:t>
             </a:r>
-            <a:endParaRPr lang="en-US" altLang="ko-KR" sz="1200" dirty="0" smtClean="0"/>
-          </a:p>
-          <a:p>
-            <a:r>
-              <a:rPr lang="en-US" altLang="ko-KR" sz="1200" dirty="0" smtClean="0"/>
+            <a:endParaRPr lang="en-US" altLang="ko-KR" sz="1200" dirty="0"/>
+          </a:p>
+          <a:p>
+            <a:r>
+              <a:rPr lang="en-US" altLang="ko-KR" sz="1200" dirty="0"/>
               <a:t>3-2. </a:t>
             </a:r>
             <a:r>
-              <a:rPr lang="ko-KR" altLang="en-US" sz="1200" dirty="0" smtClean="0"/>
+              <a:rPr lang="ko-KR" altLang="en-US" sz="1200" dirty="0"/>
               <a:t>게임 플레이</a:t>
             </a:r>
-            <a:endParaRPr lang="en-US" altLang="ko-KR" sz="1200" dirty="0" smtClean="0"/>
-          </a:p>
-          <a:p>
-            <a:r>
-              <a:rPr lang="en-US" altLang="ko-KR" sz="1200" dirty="0" smtClean="0"/>
+            <a:endParaRPr lang="en-US" altLang="ko-KR" sz="1200" dirty="0"/>
+          </a:p>
+          <a:p>
+            <a:r>
+              <a:rPr lang="en-US" altLang="ko-KR" sz="1200" dirty="0"/>
               <a:t>3-3. </a:t>
             </a:r>
             <a:r>
-              <a:rPr lang="ko-KR" altLang="en-US" sz="1200" dirty="0" smtClean="0"/>
+              <a:rPr lang="ko-KR" altLang="en-US" sz="1200" dirty="0"/>
               <a:t>게임 오버 시 스코어 확인</a:t>
             </a:r>
-            <a:endParaRPr lang="en-US" altLang="ko-KR" sz="1200" dirty="0" smtClean="0"/>
-          </a:p>
-          <a:p>
-            <a:r>
-              <a:rPr lang="en-US" altLang="ko-KR" sz="1200" dirty="0" smtClean="0"/>
+            <a:endParaRPr lang="en-US" altLang="ko-KR" sz="1200" dirty="0"/>
+          </a:p>
+          <a:p>
+            <a:r>
+              <a:rPr lang="en-US" altLang="ko-KR" sz="1200" dirty="0"/>
               <a:t>3-3-1. </a:t>
             </a:r>
             <a:r>
-              <a:rPr lang="ko-KR" altLang="en-US" sz="1200" dirty="0" err="1" smtClean="0"/>
+              <a:rPr lang="ko-KR" altLang="en-US" sz="1200" dirty="0" err="1"/>
               <a:t>하이스코어</a:t>
             </a:r>
             <a:r>
-              <a:rPr lang="ko-KR" altLang="en-US" sz="1200" dirty="0" smtClean="0"/>
+              <a:rPr lang="ko-KR" altLang="en-US" sz="1200" dirty="0"/>
               <a:t> 진입</a:t>
             </a:r>
-            <a:endParaRPr lang="en-US" altLang="ko-KR" sz="1200" dirty="0" smtClean="0"/>
-          </a:p>
-          <a:p>
-            <a:r>
-              <a:rPr lang="en-US" altLang="ko-KR" sz="1200" dirty="0" smtClean="0"/>
+            <a:endParaRPr lang="en-US" altLang="ko-KR" sz="1200" dirty="0"/>
+          </a:p>
+          <a:p>
+            <a:r>
+              <a:rPr lang="en-US" altLang="ko-KR" sz="1200" dirty="0"/>
               <a:t>3-3-1-1. </a:t>
             </a:r>
             <a:r>
-              <a:rPr lang="ko-KR" altLang="en-US" sz="1200" dirty="0" smtClean="0"/>
+              <a:rPr lang="ko-KR" altLang="en-US" sz="1200" dirty="0"/>
               <a:t>이름을 입력한다</a:t>
             </a:r>
             <a:r>
-              <a:rPr lang="en-US" altLang="ko-KR" sz="1200" dirty="0" smtClean="0"/>
+              <a:rPr lang="en-US" altLang="ko-KR" sz="1200" dirty="0"/>
               <a:t>.</a:t>
             </a:r>
           </a:p>
           <a:p>
             <a:r>
-              <a:rPr lang="en-US" altLang="ko-KR" sz="1200" dirty="0" smtClean="0"/>
+              <a:rPr lang="en-US" altLang="ko-KR" sz="1200" dirty="0"/>
               <a:t>3-3-1-2. </a:t>
             </a:r>
             <a:r>
-              <a:rPr lang="ko-KR" altLang="en-US" sz="1200" dirty="0" smtClean="0"/>
+              <a:rPr lang="ko-KR" altLang="en-US" sz="1200" dirty="0"/>
               <a:t>입력된 이름으로 </a:t>
             </a:r>
             <a:r>
-              <a:rPr lang="ko-KR" altLang="en-US" sz="1200" dirty="0" err="1" smtClean="0"/>
+              <a:rPr lang="ko-KR" altLang="en-US" sz="1200" dirty="0" err="1"/>
               <a:t>하이스코어</a:t>
             </a:r>
             <a:r>
-              <a:rPr lang="ko-KR" altLang="en-US" sz="1200" dirty="0" smtClean="0"/>
+              <a:rPr lang="ko-KR" altLang="en-US" sz="1200" dirty="0"/>
               <a:t> 정보를 갱신한다</a:t>
             </a:r>
             <a:r>
-              <a:rPr lang="en-US" altLang="ko-KR" sz="1200" dirty="0" smtClean="0"/>
+              <a:rPr lang="en-US" altLang="ko-KR" sz="1200" dirty="0"/>
               <a:t>.</a:t>
             </a:r>
           </a:p>
           <a:p>
             <a:r>
-              <a:rPr lang="en-US" altLang="ko-KR" sz="1200" dirty="0" smtClean="0"/>
+              <a:rPr lang="en-US" altLang="ko-KR" sz="1200" dirty="0"/>
               <a:t>3-3-1-3. Space Bar </a:t>
             </a:r>
             <a:r>
-              <a:rPr lang="ko-KR" altLang="en-US" sz="1200" dirty="0" smtClean="0"/>
+              <a:rPr lang="ko-KR" altLang="en-US" sz="1200" dirty="0"/>
               <a:t>입력 시 타이틀 화면으로 돌아간다</a:t>
             </a:r>
             <a:r>
-              <a:rPr lang="en-US" altLang="ko-KR" sz="1200" dirty="0" smtClean="0"/>
+              <a:rPr lang="en-US" altLang="ko-KR" sz="1200" dirty="0"/>
               <a:t>.</a:t>
             </a:r>
           </a:p>
           <a:p>
             <a:r>
-              <a:rPr lang="en-US" altLang="ko-KR" sz="1200" dirty="0" smtClean="0"/>
+              <a:rPr lang="en-US" altLang="ko-KR" sz="1200" dirty="0"/>
               <a:t>3-3-2. </a:t>
             </a:r>
             <a:r>
-              <a:rPr lang="ko-KR" altLang="en-US" sz="1200" dirty="0" err="1" smtClean="0"/>
+              <a:rPr lang="ko-KR" altLang="en-US" sz="1200" dirty="0" err="1"/>
               <a:t>하이스코어</a:t>
             </a:r>
             <a:r>
-              <a:rPr lang="ko-KR" altLang="en-US" sz="1200" dirty="0" smtClean="0"/>
+              <a:rPr lang="ko-KR" altLang="en-US" sz="1200" dirty="0"/>
               <a:t> </a:t>
             </a:r>
             <a:r>
-              <a:rPr lang="ko-KR" altLang="en-US" sz="1200" dirty="0" err="1" smtClean="0"/>
+              <a:rPr lang="ko-KR" altLang="en-US" sz="1200" dirty="0" err="1"/>
               <a:t>미진입</a:t>
             </a:r>
-            <a:endParaRPr lang="en-US" altLang="ko-KR" sz="1200" dirty="0" smtClean="0"/>
-          </a:p>
-          <a:p>
-            <a:r>
-              <a:rPr lang="en-US" altLang="ko-KR" sz="1200" dirty="0" smtClean="0"/>
+            <a:endParaRPr lang="en-US" altLang="ko-KR" sz="1200" dirty="0"/>
+          </a:p>
+          <a:p>
+            <a:r>
+              <a:rPr lang="en-US" altLang="ko-KR" sz="1200" dirty="0"/>
               <a:t>3-3-2-1. </a:t>
             </a:r>
             <a:r>
-              <a:rPr lang="ko-KR" altLang="en-US" sz="1200" dirty="0" err="1" smtClean="0"/>
+              <a:rPr lang="ko-KR" altLang="en-US" sz="1200" dirty="0" err="1"/>
               <a:t>하이스코어</a:t>
             </a:r>
             <a:r>
-              <a:rPr lang="ko-KR" altLang="en-US" sz="1200" dirty="0" smtClean="0"/>
+              <a:rPr lang="ko-KR" altLang="en-US" sz="1200" dirty="0"/>
               <a:t> 보드를 출력한다</a:t>
             </a:r>
             <a:r>
-              <a:rPr lang="en-US" altLang="ko-KR" sz="1200" dirty="0" smtClean="0"/>
+              <a:rPr lang="en-US" altLang="ko-KR" sz="1200" dirty="0"/>
               <a:t>.</a:t>
             </a:r>
           </a:p>
           <a:p>
             <a:r>
-              <a:rPr lang="en-US" altLang="ko-KR" sz="1200" dirty="0" smtClean="0"/>
+              <a:rPr lang="en-US" altLang="ko-KR" sz="1200" dirty="0"/>
               <a:t>3-3-2-2. Space Bar </a:t>
             </a:r>
             <a:r>
-              <a:rPr lang="ko-KR" altLang="en-US" sz="1200" dirty="0" smtClean="0"/>
+              <a:rPr lang="ko-KR" altLang="en-US" sz="1200" dirty="0"/>
               <a:t>입력 시 타이틀 화면으로 돌아간다</a:t>
             </a:r>
             <a:r>
-              <a:rPr lang="en-US" altLang="ko-KR" sz="1200" dirty="0" smtClean="0"/>
+              <a:rPr lang="en-US" altLang="ko-KR" sz="1200" dirty="0"/>
               <a:t>.</a:t>
             </a:r>
           </a:p>
           <a:p>
-            <a:endParaRPr lang="en-US" altLang="ko-KR" sz="1200" dirty="0" smtClean="0"/>
+            <a:endParaRPr lang="en-US" altLang="ko-KR" sz="1200" dirty="0"/>
           </a:p>
         </p:txBody>
       </p:sp>
@@ -3358,18 +3340,13 @@
           <a:p>
             <a:pPr algn="ctr"/>
             <a:r>
-              <a:rPr lang="ko-KR" altLang="en-US" sz="1400" b="1" dirty="0" smtClean="0">
+              <a:rPr lang="ko-KR" altLang="en-US" sz="1400" b="1" dirty="0">
                 <a:solidFill>
                   <a:schemeClr val="tx1"/>
                 </a:solidFill>
               </a:rPr>
               <a:t>타이틀</a:t>
             </a:r>
-            <a:endParaRPr lang="ko-KR" altLang="en-US" sz="1400" b="1" dirty="0">
-              <a:solidFill>
-                <a:schemeClr val="tx1"/>
-              </a:solidFill>
-            </a:endParaRPr>
           </a:p>
         </p:txBody>
       </p:sp>
@@ -3410,18 +3387,13 @@
           <a:p>
             <a:pPr algn="ctr"/>
             <a:r>
-              <a:rPr lang="ko-KR" altLang="en-US" sz="1400" b="1" dirty="0" smtClean="0">
+              <a:rPr lang="ko-KR" altLang="en-US" sz="1400" b="1" dirty="0">
                 <a:solidFill>
                   <a:schemeClr val="tx1"/>
                 </a:solidFill>
               </a:rPr>
               <a:t>게임</a:t>
             </a:r>
-            <a:endParaRPr lang="ko-KR" altLang="en-US" sz="1400" b="1" dirty="0">
-              <a:solidFill>
-                <a:schemeClr val="tx1"/>
-              </a:solidFill>
-            </a:endParaRPr>
           </a:p>
         </p:txBody>
       </p:sp>
@@ -3462,7 +3434,7 @@
           <a:p>
             <a:pPr algn="ctr"/>
             <a:r>
-              <a:rPr lang="ko-KR" altLang="en-US" sz="1400" b="1" dirty="0" smtClean="0">
+              <a:rPr lang="ko-KR" altLang="en-US" sz="1400" b="1" dirty="0">
                 <a:solidFill>
                   <a:schemeClr val="tx1"/>
                 </a:solidFill>
@@ -3470,7 +3442,7 @@
               <a:t>하이 스코어</a:t>
             </a:r>
             <a:r>
-              <a:rPr lang="en-US" altLang="ko-KR" sz="1400" b="1" dirty="0" smtClean="0">
+              <a:rPr lang="en-US" altLang="ko-KR" sz="1400" b="1" dirty="0">
                 <a:solidFill>
                   <a:schemeClr val="tx1"/>
                 </a:solidFill>
@@ -3522,18 +3494,13 @@
           <a:p>
             <a:pPr algn="ctr"/>
             <a:r>
-              <a:rPr lang="ko-KR" altLang="en-US" sz="1400" b="1" dirty="0" smtClean="0">
+              <a:rPr lang="ko-KR" altLang="en-US" sz="1400" b="1" dirty="0">
                 <a:solidFill>
                   <a:schemeClr val="tx1"/>
                 </a:solidFill>
               </a:rPr>
               <a:t>점수</a:t>
             </a:r>
-            <a:endParaRPr lang="ko-KR" altLang="en-US" sz="1400" b="1" dirty="0">
-              <a:solidFill>
-                <a:schemeClr val="tx1"/>
-              </a:solidFill>
-            </a:endParaRPr>
           </a:p>
         </p:txBody>
       </p:sp>
@@ -3574,7 +3541,7 @@
           <a:p>
             <a:pPr algn="ctr"/>
             <a:r>
-              <a:rPr lang="ko-KR" altLang="en-US" sz="1400" b="1" smtClean="0">
+              <a:rPr lang="ko-KR" altLang="en-US" sz="1400" b="1">
                 <a:solidFill>
                   <a:schemeClr val="tx1"/>
                 </a:solidFill>
@@ -3626,18 +3593,13 @@
           <a:p>
             <a:pPr algn="ctr"/>
             <a:r>
-              <a:rPr lang="ko-KR" altLang="en-US" sz="1400" b="1" dirty="0" smtClean="0">
+              <a:rPr lang="ko-KR" altLang="en-US" sz="1400" b="1" dirty="0">
                 <a:solidFill>
                   <a:schemeClr val="tx1"/>
                 </a:solidFill>
               </a:rPr>
               <a:t>점수 화면 갱신</a:t>
             </a:r>
-            <a:endParaRPr lang="ko-KR" altLang="en-US" sz="1400" b="1" dirty="0">
-              <a:solidFill>
-                <a:schemeClr val="tx1"/>
-              </a:solidFill>
-            </a:endParaRPr>
           </a:p>
         </p:txBody>
       </p:sp>
@@ -3948,18 +3910,17 @@
           <a:p>
             <a:pPr algn="ctr"/>
             <a:r>
-              <a:rPr lang="ko-KR" altLang="en-US" sz="1200" b="1" dirty="0" smtClean="0"/>
+              <a:rPr lang="ko-KR" altLang="en-US" sz="1200" b="1" dirty="0"/>
               <a:t>지정 키 입력</a:t>
             </a:r>
-            <a:endParaRPr lang="en-US" altLang="ko-KR" sz="1200" b="1" dirty="0" smtClean="0"/>
+            <a:endParaRPr lang="en-US" altLang="ko-KR" sz="1200" b="1" dirty="0"/>
           </a:p>
           <a:p>
             <a:pPr algn="ctr"/>
             <a:r>
-              <a:rPr lang="ko-KR" altLang="en-US" sz="1200" b="1" dirty="0" smtClean="0"/>
+              <a:rPr lang="ko-KR" altLang="en-US" sz="1200" b="1" dirty="0"/>
               <a:t>또는 클릭</a:t>
             </a:r>
-            <a:endParaRPr lang="ko-KR" altLang="en-US" sz="1200" b="1" dirty="0"/>
           </a:p>
         </p:txBody>
       </p:sp>
@@ -3994,18 +3955,17 @@
           <a:p>
             <a:pPr algn="ctr"/>
             <a:r>
-              <a:rPr lang="ko-KR" altLang="en-US" sz="1200" b="1" dirty="0" smtClean="0"/>
+              <a:rPr lang="ko-KR" altLang="en-US" sz="1200" b="1" dirty="0"/>
               <a:t>지정 키 입력</a:t>
             </a:r>
-            <a:endParaRPr lang="en-US" altLang="ko-KR" sz="1200" b="1" dirty="0" smtClean="0"/>
+            <a:endParaRPr lang="en-US" altLang="ko-KR" sz="1200" b="1" dirty="0"/>
           </a:p>
           <a:p>
             <a:pPr algn="ctr"/>
             <a:r>
-              <a:rPr lang="ko-KR" altLang="en-US" sz="1200" b="1" dirty="0" smtClean="0"/>
+              <a:rPr lang="ko-KR" altLang="en-US" sz="1200" b="1" dirty="0"/>
               <a:t>또는 클릭</a:t>
             </a:r>
-            <a:endParaRPr lang="ko-KR" altLang="en-US" sz="1200" b="1" dirty="0"/>
           </a:p>
         </p:txBody>
       </p:sp>
@@ -4062,10 +4022,9 @@
           <a:lstStyle/>
           <a:p>
             <a:r>
-              <a:rPr lang="ko-KR" altLang="en-US" dirty="0" smtClean="0"/>
+              <a:rPr lang="ko-KR" altLang="en-US" dirty="0"/>
               <a:t>블록 생성</a:t>
             </a:r>
-            <a:endParaRPr lang="ko-KR" altLang="en-US" dirty="0"/>
           </a:p>
         </p:txBody>
       </p:sp>
@@ -4096,19 +4055,19 @@
               <a:buChar char="•"/>
             </a:pPr>
             <a:r>
-              <a:rPr lang="ko-KR" altLang="en-US" dirty="0" smtClean="0"/>
+              <a:rPr lang="ko-KR" altLang="en-US" dirty="0"/>
               <a:t>블록은 </a:t>
             </a:r>
             <a:r>
-              <a:rPr lang="en-US" altLang="ko-KR" dirty="0" smtClean="0"/>
+              <a:rPr lang="en-US" altLang="ko-KR" dirty="0"/>
               <a:t>7</a:t>
             </a:r>
             <a:r>
-              <a:rPr lang="ko-KR" altLang="en-US" dirty="0" smtClean="0"/>
+              <a:rPr lang="ko-KR" altLang="en-US" dirty="0"/>
               <a:t>개의 블록을 무작위 순서로 생성한다</a:t>
             </a:r>
             <a:r>
-              <a:rPr lang="en-US" altLang="ko-KR" dirty="0" smtClean="0"/>
+              <a:rPr lang="en-US" altLang="ko-KR" dirty="0"/>
               <a:t>.</a:t>
             </a:r>
           </a:p>
@@ -4118,19 +4077,19 @@
               <a:buChar char="•"/>
             </a:pPr>
             <a:r>
-              <a:rPr lang="ko-KR" altLang="en-US" dirty="0" smtClean="0"/>
+              <a:rPr lang="ko-KR" altLang="en-US" dirty="0"/>
               <a:t>매 </a:t>
             </a:r>
             <a:r>
-              <a:rPr lang="en-US" altLang="ko-KR" dirty="0" smtClean="0"/>
+              <a:rPr lang="en-US" altLang="ko-KR" dirty="0"/>
               <a:t>7</a:t>
             </a:r>
             <a:r>
-              <a:rPr lang="ko-KR" altLang="en-US" dirty="0" smtClean="0"/>
+              <a:rPr lang="ko-KR" altLang="en-US" dirty="0"/>
               <a:t>개째 블록마다 새로운 순서를 부여한다</a:t>
             </a:r>
             <a:r>
-              <a:rPr lang="en-US" altLang="ko-KR" dirty="0" smtClean="0"/>
+              <a:rPr lang="en-US" altLang="ko-KR" dirty="0"/>
               <a:t>.</a:t>
             </a:r>
           </a:p>
@@ -5504,11 +5463,11 @@
           <a:lstStyle/>
           <a:p>
             <a:r>
-              <a:rPr lang="ko-KR" altLang="en-US" dirty="0" smtClean="0"/>
+              <a:rPr lang="ko-KR" altLang="en-US" dirty="0"/>
               <a:t>회전되는 </a:t>
             </a:r>
             <a:r>
-              <a:rPr lang="ko-KR" altLang="en-US" dirty="0" err="1" smtClean="0"/>
+              <a:rPr lang="ko-KR" altLang="en-US" dirty="0" err="1"/>
               <a:t>블럭</a:t>
             </a:r>
             <a:endParaRPr lang="ko-KR" altLang="en-US" dirty="0"/>
@@ -5538,11 +5497,11 @@
           <a:lstStyle/>
           <a:p>
             <a:r>
-              <a:rPr lang="ko-KR" altLang="en-US" smtClean="0"/>
+              <a:rPr lang="ko-KR" altLang="en-US"/>
               <a:t>회전의 중심 </a:t>
             </a:r>
             <a:r>
-              <a:rPr lang="ko-KR" altLang="en-US" dirty="0" err="1" smtClean="0"/>
+              <a:rPr lang="ko-KR" altLang="en-US" dirty="0" err="1"/>
               <a:t>블럭</a:t>
             </a:r>
             <a:endParaRPr lang="ko-KR" altLang="en-US" dirty="0"/>
@@ -5612,7 +5571,7 @@
           <a:lstStyle/>
           <a:p>
             <a:r>
-              <a:rPr lang="en-US" altLang="ko-KR" dirty="0" smtClean="0"/>
+              <a:rPr lang="en-US" altLang="ko-KR" dirty="0"/>
               <a:t>30 * 30</a:t>
             </a:r>
             <a:endParaRPr lang="ko-KR" altLang="en-US" dirty="0"/>
@@ -5702,10 +5661,9 @@
           <a:lstStyle/>
           <a:p>
             <a:r>
-              <a:rPr lang="ko-KR" altLang="en-US" dirty="0" smtClean="0"/>
+              <a:rPr lang="ko-KR" altLang="en-US" dirty="0"/>
               <a:t>게임 화면</a:t>
             </a:r>
-            <a:endParaRPr lang="ko-KR" altLang="en-US" dirty="0"/>
           </a:p>
         </p:txBody>
       </p:sp>
@@ -5770,7 +5728,7 @@
           <a:lstStyle/>
           <a:p>
             <a:r>
-              <a:rPr lang="en-US" altLang="ko-KR" dirty="0" smtClean="0"/>
+              <a:rPr lang="en-US" altLang="ko-KR" dirty="0"/>
               <a:t>800 * 600</a:t>
             </a:r>
             <a:endParaRPr lang="ko-KR" altLang="en-US" dirty="0"/>
@@ -5813,25 +5771,7 @@
           <a:lstStyle/>
           <a:p>
             <a:pPr algn="ctr"/>
-            <a:endParaRPr lang="en-US" altLang="ko-KR" dirty="0" smtClean="0"/>
-          </a:p>
-          <a:p>
-            <a:pPr algn="ctr"/>
-            <a:endParaRPr lang="en-US" altLang="ko-KR" dirty="0" smtClean="0"/>
-          </a:p>
-          <a:p>
-            <a:pPr algn="ctr"/>
-            <a:r>
-              <a:rPr lang="en-US" altLang="ko-KR" dirty="0" smtClean="0"/>
-              <a:t>PLAYER</a:t>
-            </a:r>
-          </a:p>
-          <a:p>
-            <a:pPr algn="ctr"/>
-            <a:r>
-              <a:rPr lang="en-US" altLang="ko-KR" dirty="0" smtClean="0"/>
-              <a:t>Player ID</a:t>
-            </a:r>
+            <a:endParaRPr lang="en-US" altLang="ko-KR" dirty="0"/>
           </a:p>
           <a:p>
             <a:pPr algn="ctr"/>
@@ -5840,33 +5780,15 @@
           <a:p>
             <a:pPr algn="ctr"/>
             <a:r>
-              <a:rPr lang="en-US" altLang="ko-KR" dirty="0" smtClean="0"/>
-              <a:t>Stage XXX</a:t>
+              <a:rPr lang="en-US" altLang="ko-KR" dirty="0"/>
+              <a:t>PLAYER</a:t>
             </a:r>
           </a:p>
           <a:p>
             <a:pPr algn="ctr"/>
-            <a:endParaRPr lang="en-US" altLang="ko-KR" dirty="0" smtClean="0"/>
-          </a:p>
-          <a:p>
-            <a:pPr algn="ctr"/>
-            <a:r>
-              <a:rPr lang="en-US" altLang="ko-KR" b="1" dirty="0" smtClean="0"/>
-              <a:t>NEW RECORD!</a:t>
-            </a:r>
-          </a:p>
-          <a:p>
-            <a:pPr algn="ctr"/>
-            <a:r>
-              <a:rPr lang="en-US" altLang="ko-KR" dirty="0" smtClean="0"/>
-              <a:t>Score</a:t>
-            </a:r>
-          </a:p>
-          <a:p>
-            <a:pPr algn="ctr"/>
-            <a:r>
-              <a:rPr lang="en-US" altLang="ko-KR" dirty="0" smtClean="0"/>
-              <a:t>123,456</a:t>
+            <a:r>
+              <a:rPr lang="en-US" altLang="ko-KR" dirty="0"/>
+              <a:t>Player ID</a:t>
             </a:r>
           </a:p>
           <a:p>
@@ -5876,14 +5798,50 @@
           <a:p>
             <a:pPr algn="ctr"/>
             <a:r>
-              <a:rPr lang="en-US" altLang="ko-KR" dirty="0" smtClean="0"/>
+              <a:rPr lang="en-US" altLang="ko-KR" dirty="0"/>
+              <a:t>Stage XXX</a:t>
+            </a:r>
+          </a:p>
+          <a:p>
+            <a:pPr algn="ctr"/>
+            <a:endParaRPr lang="en-US" altLang="ko-KR" dirty="0"/>
+          </a:p>
+          <a:p>
+            <a:pPr algn="ctr"/>
+            <a:r>
+              <a:rPr lang="en-US" altLang="ko-KR" b="1" dirty="0"/>
+              <a:t>NEW RECORD!</a:t>
+            </a:r>
+          </a:p>
+          <a:p>
+            <a:pPr algn="ctr"/>
+            <a:r>
+              <a:rPr lang="en-US" altLang="ko-KR" dirty="0"/>
+              <a:t>Score</a:t>
+            </a:r>
+          </a:p>
+          <a:p>
+            <a:pPr algn="ctr"/>
+            <a:r>
+              <a:rPr lang="en-US" altLang="ko-KR" dirty="0"/>
+              <a:t>123,456</a:t>
+            </a:r>
+          </a:p>
+          <a:p>
+            <a:pPr algn="ctr"/>
+            <a:endParaRPr lang="en-US" altLang="ko-KR" dirty="0"/>
+          </a:p>
+          <a:p>
+            <a:pPr algn="ctr"/>
+            <a:r>
+              <a:rPr lang="en-US" altLang="ko-KR" dirty="0"/>
               <a:t>Lines</a:t>
             </a:r>
           </a:p>
           <a:p>
             <a:pPr algn="ctr"/>
             <a:r>
-              <a:rPr lang="en-US" altLang="ko-KR" dirty="0" smtClean="0"/>
+              <a:rPr lang="en-US" altLang="ko-KR" dirty="0"/>
               <a:t>0 / 999</a:t>
             </a:r>
           </a:p>
@@ -5926,10 +5884,9 @@
           <a:p>
             <a:pPr algn="ctr"/>
             <a:r>
-              <a:rPr lang="ko-KR" altLang="en-US" dirty="0" smtClean="0"/>
+              <a:rPr lang="ko-KR" altLang="en-US" dirty="0"/>
               <a:t>블록 쌓는 곳</a:t>
             </a:r>
-            <a:endParaRPr lang="ko-KR" altLang="en-US" dirty="0"/>
           </a:p>
         </p:txBody>
       </p:sp>
@@ -6182,7 +6139,9 @@
             <a:prstGeom prst="rect">
               <a:avLst/>
             </a:prstGeom>
-            <a:grpFill/>
+            <a:solidFill>
+              <a:srgbClr val="00B0F0"/>
+            </a:solidFill>
           </p:spPr>
           <p:style>
             <a:lnRef idx="2">
@@ -6223,7 +6182,9 @@
             <a:prstGeom prst="rect">
               <a:avLst/>
             </a:prstGeom>
-            <a:grpFill/>
+            <a:solidFill>
+              <a:srgbClr val="00B0F0"/>
+            </a:solidFill>
           </p:spPr>
           <p:style>
             <a:lnRef idx="2">
@@ -6264,7 +6225,9 @@
             <a:prstGeom prst="rect">
               <a:avLst/>
             </a:prstGeom>
-            <a:grpFill/>
+            <a:solidFill>
+              <a:srgbClr val="00B0F0"/>
+            </a:solidFill>
           </p:spPr>
           <p:style>
             <a:lnRef idx="2">
@@ -6365,7 +6328,7 @@
               <a:avLst/>
             </a:prstGeom>
             <a:solidFill>
-              <a:schemeClr val="accent1"/>
+              <a:srgbClr val="00B050"/>
             </a:solidFill>
           </p:spPr>
           <p:style>
@@ -6408,7 +6371,7 @@
               <a:avLst/>
             </a:prstGeom>
             <a:solidFill>
-              <a:schemeClr val="accent1"/>
+              <a:srgbClr val="00B050"/>
             </a:solidFill>
           </p:spPr>
           <p:style>
@@ -6451,7 +6414,7 @@
               <a:avLst/>
             </a:prstGeom>
             <a:solidFill>
-              <a:schemeClr val="accent1"/>
+              <a:srgbClr val="00B050"/>
             </a:solidFill>
           </p:spPr>
           <p:style>
@@ -6551,6 +6514,9 @@
             <a:prstGeom prst="rect">
               <a:avLst/>
             </a:prstGeom>
+            <a:solidFill>
+              <a:srgbClr val="C864FF"/>
+            </a:solidFill>
           </p:spPr>
           <p:style>
             <a:lnRef idx="2">
@@ -6591,6 +6557,9 @@
             <a:prstGeom prst="rect">
               <a:avLst/>
             </a:prstGeom>
+            <a:solidFill>
+              <a:srgbClr val="C864FF"/>
+            </a:solidFill>
           </p:spPr>
           <p:style>
             <a:lnRef idx="2">
@@ -6631,6 +6600,9 @@
             <a:prstGeom prst="rect">
               <a:avLst/>
             </a:prstGeom>
+            <a:solidFill>
+              <a:srgbClr val="C864FF"/>
+            </a:solidFill>
           </p:spPr>
           <p:style>
             <a:lnRef idx="2">
@@ -6907,6 +6879,9 @@
             <a:prstGeom prst="rect">
               <a:avLst/>
             </a:prstGeom>
+            <a:solidFill>
+              <a:srgbClr val="FFFFA8"/>
+            </a:solidFill>
           </p:spPr>
           <p:style>
             <a:lnRef idx="2">
@@ -6947,6 +6922,9 @@
             <a:prstGeom prst="rect">
               <a:avLst/>
             </a:prstGeom>
+            <a:solidFill>
+              <a:srgbClr val="FFFFA8"/>
+            </a:solidFill>
           </p:spPr>
           <p:style>
             <a:lnRef idx="2">
@@ -6987,6 +6965,9 @@
             <a:prstGeom prst="rect">
               <a:avLst/>
             </a:prstGeom>
+            <a:solidFill>
+              <a:srgbClr val="FFFFA8"/>
+            </a:solidFill>
           </p:spPr>
           <p:style>
             <a:lnRef idx="2">
@@ -7341,11 +7322,11 @@
           <a:lstStyle/>
           <a:p>
             <a:r>
-              <a:rPr lang="ko-KR" altLang="en-US" dirty="0" smtClean="0"/>
+              <a:rPr lang="ko-KR" altLang="en-US" dirty="0"/>
               <a:t>회전되는 </a:t>
             </a:r>
             <a:r>
-              <a:rPr lang="ko-KR" altLang="en-US" dirty="0" err="1" smtClean="0"/>
+              <a:rPr lang="ko-KR" altLang="en-US" dirty="0" err="1"/>
               <a:t>블럭</a:t>
             </a:r>
             <a:endParaRPr lang="ko-KR" altLang="en-US" dirty="0"/>
@@ -7375,11 +7356,11 @@
           <a:lstStyle/>
           <a:p>
             <a:r>
-              <a:rPr lang="ko-KR" altLang="en-US" smtClean="0"/>
+              <a:rPr lang="ko-KR" altLang="en-US"/>
               <a:t>회전의 중심 </a:t>
             </a:r>
             <a:r>
-              <a:rPr lang="ko-KR" altLang="en-US" dirty="0" err="1" smtClean="0"/>
+              <a:rPr lang="ko-KR" altLang="en-US" dirty="0" err="1"/>
               <a:t>블럭</a:t>
             </a:r>
             <a:endParaRPr lang="ko-KR" altLang="en-US" dirty="0"/>
@@ -7449,7 +7430,7 @@
           <a:lstStyle/>
           <a:p>
             <a:r>
-              <a:rPr lang="en-US" altLang="ko-KR" dirty="0" smtClean="0"/>
+              <a:rPr lang="en-US" altLang="ko-KR" dirty="0"/>
               <a:t>30 * 30</a:t>
             </a:r>
             <a:endParaRPr lang="ko-KR" altLang="en-US" dirty="0"/>
@@ -7479,72 +7460,72 @@
           <a:lstStyle/>
           <a:p>
             <a:r>
-              <a:rPr lang="ko-KR" altLang="en-US" dirty="0" smtClean="0"/>
+              <a:rPr lang="ko-KR" altLang="en-US" dirty="0"/>
               <a:t>가로</a:t>
             </a:r>
             <a:r>
-              <a:rPr lang="en-US" altLang="ko-KR" dirty="0" smtClean="0"/>
+              <a:rPr lang="en-US" altLang="ko-KR" dirty="0"/>
               <a:t> 11</a:t>
             </a:r>
             <a:r>
-              <a:rPr lang="ko-KR" altLang="en-US" dirty="0" smtClean="0"/>
+              <a:rPr lang="ko-KR" altLang="en-US" dirty="0"/>
               <a:t>칸</a:t>
             </a:r>
-            <a:endParaRPr lang="en-US" altLang="ko-KR" dirty="0" smtClean="0"/>
-          </a:p>
-          <a:p>
-            <a:r>
-              <a:rPr lang="ko-KR" altLang="en-US" dirty="0" smtClean="0"/>
+            <a:endParaRPr lang="en-US" altLang="ko-KR" dirty="0"/>
+          </a:p>
+          <a:p>
+            <a:r>
+              <a:rPr lang="ko-KR" altLang="en-US" dirty="0"/>
               <a:t>세로 </a:t>
             </a:r>
             <a:r>
-              <a:rPr lang="en-US" altLang="ko-KR" dirty="0" smtClean="0"/>
+              <a:rPr lang="en-US" altLang="ko-KR" dirty="0"/>
               <a:t>21</a:t>
             </a:r>
             <a:r>
-              <a:rPr lang="ko-KR" altLang="en-US" dirty="0" smtClean="0"/>
+              <a:rPr lang="ko-KR" altLang="en-US" dirty="0"/>
               <a:t>칸</a:t>
             </a:r>
             <a:r>
-              <a:rPr lang="en-US" altLang="ko-KR" dirty="0" smtClean="0"/>
+              <a:rPr lang="en-US" altLang="ko-KR" dirty="0"/>
               <a:t>(19 + 2</a:t>
             </a:r>
             <a:r>
-              <a:rPr lang="en-US" altLang="ko-KR" sz="1200" dirty="0" smtClean="0"/>
+              <a:rPr lang="en-US" altLang="ko-KR" sz="1200" dirty="0"/>
               <a:t>(</a:t>
             </a:r>
             <a:r>
-              <a:rPr lang="ko-KR" altLang="en-US" sz="1200" dirty="0" smtClean="0"/>
+              <a:rPr lang="ko-KR" altLang="en-US" sz="1200" dirty="0"/>
               <a:t>버퍼</a:t>
             </a:r>
             <a:r>
-              <a:rPr lang="en-US" altLang="ko-KR" sz="1200" dirty="0" smtClean="0"/>
+              <a:rPr lang="en-US" altLang="ko-KR" sz="1200" dirty="0"/>
               <a:t>)</a:t>
             </a:r>
             <a:r>
-              <a:rPr lang="en-US" altLang="ko-KR" dirty="0" smtClean="0"/>
+              <a:rPr lang="en-US" altLang="ko-KR" dirty="0"/>
               <a:t>)</a:t>
             </a:r>
           </a:p>
           <a:p>
             <a:r>
-              <a:rPr lang="ko-KR" altLang="en-US" dirty="0" smtClean="0"/>
+              <a:rPr lang="ko-KR" altLang="en-US" dirty="0"/>
               <a:t>칸 </a:t>
             </a:r>
             <a:r>
-              <a:rPr lang="en-US" altLang="ko-KR" dirty="0" smtClean="0"/>
+              <a:rPr lang="en-US" altLang="ko-KR" dirty="0"/>
               <a:t>= 40 </a:t>
             </a:r>
             <a:r>
-              <a:rPr lang="en-US" altLang="ko-KR" dirty="0" err="1" smtClean="0"/>
+              <a:rPr lang="en-US" altLang="ko-KR" dirty="0" err="1"/>
               <a:t>px</a:t>
             </a:r>
             <a:r>
-              <a:rPr lang="en-US" altLang="ko-KR" dirty="0" smtClean="0"/>
+              <a:rPr lang="en-US" altLang="ko-KR" dirty="0"/>
               <a:t> * 40 </a:t>
             </a:r>
             <a:r>
-              <a:rPr lang="en-US" altLang="ko-KR" dirty="0" err="1" smtClean="0"/>
+              <a:rPr lang="en-US" altLang="ko-KR" dirty="0" err="1"/>
               <a:t>px</a:t>
             </a:r>
             <a:endParaRPr lang="ko-KR" altLang="en-US" dirty="0"/>
@@ -7602,7 +7583,7 @@
             <a:p>
               <a:pPr algn="ctr"/>
               <a:r>
-                <a:rPr lang="ko-KR" altLang="en-US" smtClean="0"/>
+                <a:rPr lang="ko-KR" altLang="en-US"/>
                 <a:t>블럭</a:t>
               </a:r>
               <a:endParaRPr lang="ko-KR" altLang="en-US" dirty="0"/>
@@ -7687,26 +7668,22 @@
               <a:pPr algn="ctr"/>
               <a:r>
                 <a:rPr lang="ko-KR" altLang="en-US" dirty="0" err="1"/>
-                <a:t>갯</a:t>
+                <a:t>갯수</a:t>
               </a:r>
               <a:r>
-                <a:rPr lang="ko-KR" altLang="en-US" dirty="0" err="1" smtClean="0"/>
-                <a:t>수</a:t>
-              </a:r>
-              <a:r>
-                <a:rPr lang="ko-KR" altLang="en-US" dirty="0" smtClean="0"/>
+                <a:rPr lang="ko-KR" altLang="en-US" dirty="0"/>
                 <a:t>  </a:t>
               </a:r>
               <a:r>
-                <a:rPr lang="en-US" altLang="ko-KR" dirty="0" smtClean="0"/>
+                <a:rPr lang="en-US" altLang="ko-KR" dirty="0"/>
                 <a:t>( </a:t>
               </a:r>
               <a:r>
-                <a:rPr lang="en-US" altLang="ko-KR" dirty="0" err="1" smtClean="0"/>
+                <a:rPr lang="en-US" altLang="ko-KR" dirty="0" err="1"/>
                 <a:t>xx.x</a:t>
               </a:r>
               <a:r>
-                <a:rPr lang="en-US" altLang="ko-KR" dirty="0" smtClean="0"/>
+                <a:rPr lang="en-US" altLang="ko-KR" dirty="0"/>
                 <a:t>%)</a:t>
               </a:r>
               <a:endParaRPr lang="ko-KR" altLang="en-US" dirty="0"/>
@@ -7765,7 +7742,7 @@
             <a:p>
               <a:pPr algn="ctr"/>
               <a:r>
-                <a:rPr lang="ko-KR" altLang="en-US" smtClean="0"/>
+                <a:rPr lang="ko-KR" altLang="en-US"/>
                 <a:t>블럭</a:t>
               </a:r>
               <a:endParaRPr lang="ko-KR" altLang="en-US" dirty="0"/>
@@ -7850,26 +7827,22 @@
               <a:pPr algn="ctr"/>
               <a:r>
                 <a:rPr lang="ko-KR" altLang="en-US" dirty="0" err="1"/>
-                <a:t>갯</a:t>
+                <a:t>갯수</a:t>
               </a:r>
               <a:r>
-                <a:rPr lang="ko-KR" altLang="en-US" dirty="0" err="1" smtClean="0"/>
-                <a:t>수</a:t>
-              </a:r>
-              <a:r>
-                <a:rPr lang="ko-KR" altLang="en-US" dirty="0" smtClean="0"/>
+                <a:rPr lang="ko-KR" altLang="en-US" dirty="0"/>
                 <a:t>  </a:t>
               </a:r>
               <a:r>
-                <a:rPr lang="en-US" altLang="ko-KR" dirty="0" smtClean="0"/>
+                <a:rPr lang="en-US" altLang="ko-KR" dirty="0"/>
                 <a:t>( </a:t>
               </a:r>
               <a:r>
-                <a:rPr lang="en-US" altLang="ko-KR" dirty="0" err="1" smtClean="0"/>
+                <a:rPr lang="en-US" altLang="ko-KR" dirty="0" err="1"/>
                 <a:t>xx.x</a:t>
               </a:r>
               <a:r>
-                <a:rPr lang="en-US" altLang="ko-KR" dirty="0" smtClean="0"/>
+                <a:rPr lang="en-US" altLang="ko-KR" dirty="0"/>
                 <a:t>%)</a:t>
               </a:r>
               <a:endParaRPr lang="ko-KR" altLang="en-US" dirty="0"/>
@@ -7928,7 +7901,7 @@
             <a:p>
               <a:pPr algn="ctr"/>
               <a:r>
-                <a:rPr lang="ko-KR" altLang="en-US" smtClean="0"/>
+                <a:rPr lang="ko-KR" altLang="en-US"/>
                 <a:t>블럭</a:t>
               </a:r>
               <a:endParaRPr lang="ko-KR" altLang="en-US" dirty="0"/>
@@ -8013,26 +7986,22 @@
               <a:pPr algn="ctr"/>
               <a:r>
                 <a:rPr lang="ko-KR" altLang="en-US" dirty="0" err="1"/>
-                <a:t>갯</a:t>
+                <a:t>갯수</a:t>
               </a:r>
               <a:r>
-                <a:rPr lang="ko-KR" altLang="en-US" dirty="0" err="1" smtClean="0"/>
-                <a:t>수</a:t>
-              </a:r>
-              <a:r>
-                <a:rPr lang="ko-KR" altLang="en-US" dirty="0" smtClean="0"/>
+                <a:rPr lang="ko-KR" altLang="en-US" dirty="0"/>
                 <a:t>  </a:t>
               </a:r>
               <a:r>
-                <a:rPr lang="en-US" altLang="ko-KR" dirty="0" smtClean="0"/>
+                <a:rPr lang="en-US" altLang="ko-KR" dirty="0"/>
                 <a:t>( </a:t>
               </a:r>
               <a:r>
-                <a:rPr lang="en-US" altLang="ko-KR" dirty="0" err="1" smtClean="0"/>
+                <a:rPr lang="en-US" altLang="ko-KR" dirty="0" err="1"/>
                 <a:t>xx.x</a:t>
               </a:r>
               <a:r>
-                <a:rPr lang="en-US" altLang="ko-KR" dirty="0" smtClean="0"/>
+                <a:rPr lang="en-US" altLang="ko-KR" dirty="0"/>
                 <a:t>%)</a:t>
               </a:r>
               <a:endParaRPr lang="ko-KR" altLang="en-US" dirty="0"/>
@@ -8091,7 +8060,7 @@
             <a:p>
               <a:pPr algn="ctr"/>
               <a:r>
-                <a:rPr lang="ko-KR" altLang="en-US" smtClean="0"/>
+                <a:rPr lang="ko-KR" altLang="en-US"/>
                 <a:t>블럭</a:t>
               </a:r>
               <a:endParaRPr lang="ko-KR" altLang="en-US" dirty="0"/>
@@ -8176,26 +8145,22 @@
               <a:pPr algn="ctr"/>
               <a:r>
                 <a:rPr lang="ko-KR" altLang="en-US" dirty="0" err="1"/>
-                <a:t>갯</a:t>
+                <a:t>갯수</a:t>
               </a:r>
               <a:r>
-                <a:rPr lang="ko-KR" altLang="en-US" dirty="0" err="1" smtClean="0"/>
-                <a:t>수</a:t>
-              </a:r>
-              <a:r>
-                <a:rPr lang="ko-KR" altLang="en-US" dirty="0" smtClean="0"/>
+                <a:rPr lang="ko-KR" altLang="en-US" dirty="0"/>
                 <a:t>  </a:t>
               </a:r>
               <a:r>
-                <a:rPr lang="en-US" altLang="ko-KR" dirty="0" smtClean="0"/>
+                <a:rPr lang="en-US" altLang="ko-KR" dirty="0"/>
                 <a:t>( </a:t>
               </a:r>
               <a:r>
-                <a:rPr lang="en-US" altLang="ko-KR" dirty="0" err="1" smtClean="0"/>
+                <a:rPr lang="en-US" altLang="ko-KR" dirty="0" err="1"/>
                 <a:t>xx.x</a:t>
               </a:r>
               <a:r>
-                <a:rPr lang="en-US" altLang="ko-KR" dirty="0" smtClean="0"/>
+                <a:rPr lang="en-US" altLang="ko-KR" dirty="0"/>
                 <a:t>%)</a:t>
               </a:r>
               <a:endParaRPr lang="ko-KR" altLang="en-US" dirty="0"/>
@@ -8254,7 +8219,7 @@
             <a:p>
               <a:pPr algn="ctr"/>
               <a:r>
-                <a:rPr lang="ko-KR" altLang="en-US" smtClean="0"/>
+                <a:rPr lang="ko-KR" altLang="en-US"/>
                 <a:t>블럭</a:t>
               </a:r>
               <a:endParaRPr lang="ko-KR" altLang="en-US" dirty="0"/>
@@ -8339,26 +8304,22 @@
               <a:pPr algn="ctr"/>
               <a:r>
                 <a:rPr lang="ko-KR" altLang="en-US" dirty="0" err="1"/>
-                <a:t>갯</a:t>
+                <a:t>갯수</a:t>
               </a:r>
               <a:r>
-                <a:rPr lang="ko-KR" altLang="en-US" dirty="0" err="1" smtClean="0"/>
-                <a:t>수</a:t>
-              </a:r>
-              <a:r>
-                <a:rPr lang="ko-KR" altLang="en-US" dirty="0" smtClean="0"/>
+                <a:rPr lang="ko-KR" altLang="en-US" dirty="0"/>
                 <a:t>  </a:t>
               </a:r>
               <a:r>
-                <a:rPr lang="en-US" altLang="ko-KR" dirty="0" smtClean="0"/>
+                <a:rPr lang="en-US" altLang="ko-KR" dirty="0"/>
                 <a:t>( </a:t>
               </a:r>
               <a:r>
-                <a:rPr lang="en-US" altLang="ko-KR" dirty="0" err="1" smtClean="0"/>
+                <a:rPr lang="en-US" altLang="ko-KR" dirty="0" err="1"/>
                 <a:t>xx.x</a:t>
               </a:r>
               <a:r>
-                <a:rPr lang="en-US" altLang="ko-KR" dirty="0" smtClean="0"/>
+                <a:rPr lang="en-US" altLang="ko-KR" dirty="0"/>
                 <a:t>%)</a:t>
               </a:r>
               <a:endParaRPr lang="ko-KR" altLang="en-US" dirty="0"/>
@@ -8417,7 +8378,7 @@
             <a:p>
               <a:pPr algn="ctr"/>
               <a:r>
-                <a:rPr lang="ko-KR" altLang="en-US" smtClean="0"/>
+                <a:rPr lang="ko-KR" altLang="en-US"/>
                 <a:t>블럭</a:t>
               </a:r>
               <a:endParaRPr lang="ko-KR" altLang="en-US" dirty="0"/>
@@ -8502,26 +8463,22 @@
               <a:pPr algn="ctr"/>
               <a:r>
                 <a:rPr lang="ko-KR" altLang="en-US" dirty="0" err="1"/>
-                <a:t>갯</a:t>
+                <a:t>갯수</a:t>
               </a:r>
               <a:r>
-                <a:rPr lang="ko-KR" altLang="en-US" dirty="0" err="1" smtClean="0"/>
-                <a:t>수</a:t>
-              </a:r>
-              <a:r>
-                <a:rPr lang="ko-KR" altLang="en-US" dirty="0" smtClean="0"/>
+                <a:rPr lang="ko-KR" altLang="en-US" dirty="0"/>
                 <a:t>  </a:t>
               </a:r>
               <a:r>
-                <a:rPr lang="en-US" altLang="ko-KR" dirty="0" smtClean="0"/>
+                <a:rPr lang="en-US" altLang="ko-KR" dirty="0"/>
                 <a:t>( </a:t>
               </a:r>
               <a:r>
-                <a:rPr lang="en-US" altLang="ko-KR" dirty="0" err="1" smtClean="0"/>
+                <a:rPr lang="en-US" altLang="ko-KR" dirty="0" err="1"/>
                 <a:t>xx.x</a:t>
               </a:r>
               <a:r>
-                <a:rPr lang="en-US" altLang="ko-KR" dirty="0" smtClean="0"/>
+                <a:rPr lang="en-US" altLang="ko-KR" dirty="0"/>
                 <a:t>%)</a:t>
               </a:r>
               <a:endParaRPr lang="ko-KR" altLang="en-US" dirty="0"/>
@@ -8592,10 +8549,9 @@
           <a:p>
             <a:pPr algn="ctr"/>
             <a:r>
-              <a:rPr lang="en-US" altLang="ko-KR" dirty="0" smtClean="0"/>
+              <a:rPr lang="en-US" altLang="ko-KR" dirty="0"/>
               <a:t>Next</a:t>
             </a:r>
-            <a:endParaRPr lang="en-US" altLang="ko-KR" dirty="0" smtClean="0"/>
           </a:p>
         </p:txBody>
       </p:sp>
@@ -8827,11 +8783,11 @@
           <a:lstStyle/>
           <a:p>
             <a:r>
-              <a:rPr lang="ko-KR" altLang="en-US" dirty="0" smtClean="0"/>
+              <a:rPr lang="ko-KR" altLang="en-US" dirty="0"/>
               <a:t>정보 영역 </a:t>
             </a:r>
             <a:r>
-              <a:rPr lang="en-US" altLang="ko-KR" dirty="0" smtClean="0"/>
+              <a:rPr lang="en-US" altLang="ko-KR" dirty="0"/>
               <a:t>(10,10 ~ 200,590)</a:t>
             </a:r>
             <a:endParaRPr lang="ko-KR" altLang="en-US" dirty="0"/>
@@ -8912,43 +8868,7 @@
           <a:lstStyle/>
           <a:p>
             <a:pPr algn="ctr"/>
-            <a:endParaRPr lang="en-US" altLang="ko-KR" dirty="0" smtClean="0"/>
-          </a:p>
-          <a:p>
-            <a:pPr algn="ctr"/>
-            <a:endParaRPr lang="en-US" altLang="ko-KR" dirty="0" smtClean="0"/>
-          </a:p>
-          <a:p>
-            <a:pPr algn="ctr"/>
-            <a:r>
-              <a:rPr lang="en-US" altLang="ko-KR" dirty="0" smtClean="0"/>
-              <a:t>Stage XXX</a:t>
-            </a:r>
-          </a:p>
-          <a:p>
-            <a:pPr algn="ctr"/>
-            <a:endParaRPr lang="en-US" altLang="ko-KR" dirty="0" smtClean="0"/>
-          </a:p>
-          <a:p>
-            <a:pPr algn="ctr"/>
-            <a:r>
-              <a:rPr lang="en-US" altLang="ko-KR" b="1" dirty="0" smtClean="0"/>
-              <a:t>NEW RECORD!</a:t>
-            </a:r>
-          </a:p>
-          <a:p>
-            <a:pPr algn="ctr"/>
-            <a:r>
-              <a:rPr lang="en-US" altLang="ko-KR" dirty="0" smtClean="0"/>
-              <a:t>Score</a:t>
-            </a:r>
-          </a:p>
-          <a:p>
-            <a:pPr algn="ctr"/>
-            <a:r>
-              <a:rPr lang="en-US" altLang="ko-KR" dirty="0" smtClean="0"/>
-              <a:t>123,456</a:t>
-            </a:r>
+            <a:endParaRPr lang="en-US" altLang="ko-KR" dirty="0"/>
           </a:p>
           <a:p>
             <a:pPr algn="ctr"/>
@@ -8957,14 +8877,50 @@
           <a:p>
             <a:pPr algn="ctr"/>
             <a:r>
-              <a:rPr lang="en-US" altLang="ko-KR" dirty="0" smtClean="0"/>
+              <a:rPr lang="en-US" altLang="ko-KR" dirty="0"/>
+              <a:t>Stage XXX</a:t>
+            </a:r>
+          </a:p>
+          <a:p>
+            <a:pPr algn="ctr"/>
+            <a:endParaRPr lang="en-US" altLang="ko-KR" dirty="0"/>
+          </a:p>
+          <a:p>
+            <a:pPr algn="ctr"/>
+            <a:r>
+              <a:rPr lang="en-US" altLang="ko-KR" b="1" dirty="0"/>
+              <a:t>NEW RECORD!</a:t>
+            </a:r>
+          </a:p>
+          <a:p>
+            <a:pPr algn="ctr"/>
+            <a:r>
+              <a:rPr lang="en-US" altLang="ko-KR" dirty="0"/>
+              <a:t>Score</a:t>
+            </a:r>
+          </a:p>
+          <a:p>
+            <a:pPr algn="ctr"/>
+            <a:r>
+              <a:rPr lang="en-US" altLang="ko-KR" dirty="0"/>
+              <a:t>123,456</a:t>
+            </a:r>
+          </a:p>
+          <a:p>
+            <a:pPr algn="ctr"/>
+            <a:endParaRPr lang="en-US" altLang="ko-KR" dirty="0"/>
+          </a:p>
+          <a:p>
+            <a:pPr algn="ctr"/>
+            <a:r>
+              <a:rPr lang="en-US" altLang="ko-KR" dirty="0"/>
               <a:t>Lines</a:t>
             </a:r>
           </a:p>
           <a:p>
             <a:pPr algn="ctr"/>
             <a:r>
-              <a:rPr lang="en-US" altLang="ko-KR" dirty="0" smtClean="0"/>
+              <a:rPr lang="en-US" altLang="ko-KR" dirty="0"/>
               <a:t>0 / 999</a:t>
             </a:r>
           </a:p>
@@ -10338,11 +10294,11 @@
           <a:lstStyle/>
           <a:p>
             <a:r>
-              <a:rPr lang="ko-KR" altLang="en-US" dirty="0" smtClean="0"/>
+              <a:rPr lang="ko-KR" altLang="en-US" dirty="0"/>
               <a:t>회전되는 </a:t>
             </a:r>
             <a:r>
-              <a:rPr lang="ko-KR" altLang="en-US" dirty="0" err="1" smtClean="0"/>
+              <a:rPr lang="ko-KR" altLang="en-US" dirty="0" err="1"/>
               <a:t>블럭</a:t>
             </a:r>
             <a:endParaRPr lang="ko-KR" altLang="en-US" dirty="0"/>
@@ -10372,11 +10328,11 @@
           <a:lstStyle/>
           <a:p>
             <a:r>
-              <a:rPr lang="ko-KR" altLang="en-US" smtClean="0"/>
+              <a:rPr lang="ko-KR" altLang="en-US"/>
               <a:t>회전의 중심 </a:t>
             </a:r>
             <a:r>
-              <a:rPr lang="ko-KR" altLang="en-US" dirty="0" err="1" smtClean="0"/>
+              <a:rPr lang="ko-KR" altLang="en-US" dirty="0" err="1"/>
               <a:t>블럭</a:t>
             </a:r>
             <a:endParaRPr lang="ko-KR" altLang="en-US" dirty="0"/>
@@ -10446,7 +10402,7 @@
           <a:lstStyle/>
           <a:p>
             <a:r>
-              <a:rPr lang="en-US" altLang="ko-KR" dirty="0" smtClean="0"/>
+              <a:rPr lang="en-US" altLang="ko-KR" dirty="0"/>
               <a:t>30 * 30</a:t>
             </a:r>
             <a:endParaRPr lang="ko-KR" altLang="en-US" dirty="0"/>
@@ -10516,10 +10472,9 @@
           <a:p>
             <a:pPr algn="ctr"/>
             <a:r>
-              <a:rPr lang="en-US" altLang="ko-KR" dirty="0" smtClean="0"/>
+              <a:rPr lang="en-US" altLang="ko-KR" dirty="0"/>
               <a:t>Next</a:t>
             </a:r>
-            <a:endParaRPr lang="en-US" altLang="ko-KR" dirty="0" smtClean="0"/>
           </a:p>
         </p:txBody>
       </p:sp>
@@ -10721,11 +10676,11 @@
           <a:lstStyle/>
           <a:p>
             <a:r>
-              <a:rPr lang="ko-KR" altLang="en-US" dirty="0" smtClean="0"/>
+              <a:rPr lang="ko-KR" altLang="en-US" dirty="0"/>
               <a:t>정보 영역 </a:t>
             </a:r>
             <a:r>
-              <a:rPr lang="en-US" altLang="ko-KR" dirty="0" smtClean="0"/>
+              <a:rPr lang="en-US" altLang="ko-KR" dirty="0"/>
               <a:t>(10,10 ~ 200,590)</a:t>
             </a:r>
             <a:endParaRPr lang="ko-KR" altLang="en-US" dirty="0"/>
@@ -10785,11 +10740,11 @@
           <a:lstStyle/>
           <a:p>
             <a:r>
-              <a:rPr lang="ko-KR" altLang="en-US" dirty="0" smtClean="0"/>
+              <a:rPr lang="ko-KR" altLang="en-US" dirty="0"/>
               <a:t>플레이 영역 </a:t>
             </a:r>
             <a:r>
-              <a:rPr lang="en-US" altLang="ko-KR" dirty="0" smtClean="0"/>
+              <a:rPr lang="en-US" altLang="ko-KR" dirty="0"/>
               <a:t>(210, 10 ~ 580,590)</a:t>
             </a:r>
             <a:endParaRPr lang="ko-KR" altLang="en-US" dirty="0"/>
@@ -10885,10 +10840,9 @@
             <a:p>
               <a:pPr algn="ctr"/>
               <a:r>
-                <a:rPr lang="ko-KR" altLang="en-US" dirty="0" smtClean="0"/>
+                <a:rPr lang="ko-KR" altLang="en-US" dirty="0"/>
                 <a:t>블록 쌓는 곳</a:t>
               </a:r>
-              <a:endParaRPr lang="ko-KR" altLang="en-US" dirty="0"/>
             </a:p>
           </p:txBody>
         </p:sp>
@@ -10915,72 +10869,72 @@
             <a:lstStyle/>
             <a:p>
               <a:r>
-                <a:rPr lang="ko-KR" altLang="en-US" dirty="0" smtClean="0"/>
+                <a:rPr lang="ko-KR" altLang="en-US" dirty="0"/>
                 <a:t>가로</a:t>
               </a:r>
               <a:r>
-                <a:rPr lang="en-US" altLang="ko-KR" dirty="0" smtClean="0"/>
+                <a:rPr lang="en-US" altLang="ko-KR" dirty="0"/>
                 <a:t> 12</a:t>
               </a:r>
               <a:r>
-                <a:rPr lang="ko-KR" altLang="en-US" dirty="0" smtClean="0"/>
+                <a:rPr lang="ko-KR" altLang="en-US" dirty="0"/>
                 <a:t>칸</a:t>
               </a:r>
-              <a:endParaRPr lang="en-US" altLang="ko-KR" dirty="0" smtClean="0"/>
+              <a:endParaRPr lang="en-US" altLang="ko-KR" dirty="0"/>
             </a:p>
             <a:p>
               <a:r>
-                <a:rPr lang="ko-KR" altLang="en-US" dirty="0" smtClean="0"/>
+                <a:rPr lang="ko-KR" altLang="en-US" dirty="0"/>
                 <a:t>세로 </a:t>
               </a:r>
               <a:r>
-                <a:rPr lang="en-US" altLang="ko-KR" dirty="0" smtClean="0"/>
+                <a:rPr lang="en-US" altLang="ko-KR" dirty="0"/>
                 <a:t>22</a:t>
               </a:r>
               <a:r>
-                <a:rPr lang="ko-KR" altLang="en-US" dirty="0" smtClean="0"/>
+                <a:rPr lang="ko-KR" altLang="en-US" dirty="0"/>
                 <a:t>칸</a:t>
               </a:r>
               <a:r>
-                <a:rPr lang="en-US" altLang="ko-KR" dirty="0" smtClean="0"/>
+                <a:rPr lang="en-US" altLang="ko-KR" dirty="0"/>
                 <a:t>(20 + 2</a:t>
               </a:r>
               <a:r>
-                <a:rPr lang="en-US" altLang="ko-KR" sz="1200" dirty="0" smtClean="0"/>
+                <a:rPr lang="en-US" altLang="ko-KR" sz="1200" dirty="0"/>
                 <a:t>(</a:t>
               </a:r>
               <a:r>
-                <a:rPr lang="ko-KR" altLang="en-US" sz="1200" dirty="0" smtClean="0"/>
+                <a:rPr lang="ko-KR" altLang="en-US" sz="1200" dirty="0"/>
                 <a:t>버퍼</a:t>
               </a:r>
               <a:r>
-                <a:rPr lang="en-US" altLang="ko-KR" sz="1200" dirty="0" smtClean="0"/>
+                <a:rPr lang="en-US" altLang="ko-KR" sz="1200" dirty="0"/>
                 <a:t>)</a:t>
               </a:r>
               <a:r>
-                <a:rPr lang="en-US" altLang="ko-KR" dirty="0" smtClean="0"/>
+                <a:rPr lang="en-US" altLang="ko-KR" dirty="0"/>
                 <a:t>)</a:t>
               </a:r>
             </a:p>
             <a:p>
               <a:r>
-                <a:rPr lang="ko-KR" altLang="en-US" dirty="0" smtClean="0"/>
+                <a:rPr lang="ko-KR" altLang="en-US" dirty="0"/>
                 <a:t>칸 </a:t>
               </a:r>
               <a:r>
-                <a:rPr lang="en-US" altLang="ko-KR" dirty="0" smtClean="0"/>
+                <a:rPr lang="en-US" altLang="ko-KR" dirty="0"/>
                 <a:t>= 30 </a:t>
               </a:r>
               <a:r>
-                <a:rPr lang="en-US" altLang="ko-KR" dirty="0" err="1" smtClean="0"/>
+                <a:rPr lang="en-US" altLang="ko-KR" dirty="0" err="1"/>
                 <a:t>px</a:t>
               </a:r>
               <a:r>
-                <a:rPr lang="en-US" altLang="ko-KR" dirty="0" smtClean="0"/>
+                <a:rPr lang="en-US" altLang="ko-KR" dirty="0"/>
                 <a:t> * 30 </a:t>
               </a:r>
               <a:r>
-                <a:rPr lang="en-US" altLang="ko-KR" dirty="0" err="1" smtClean="0"/>
+                <a:rPr lang="en-US" altLang="ko-KR" dirty="0" err="1"/>
                 <a:t>px</a:t>
               </a:r>
               <a:endParaRPr lang="ko-KR" altLang="en-US" dirty="0"/>
@@ -15795,11 +15749,11 @@
           <a:lstStyle/>
           <a:p>
             <a:r>
-              <a:rPr lang="ko-KR" altLang="en-US" dirty="0" smtClean="0"/>
+              <a:rPr lang="ko-KR" altLang="en-US" dirty="0"/>
               <a:t>회전되는 </a:t>
             </a:r>
             <a:r>
-              <a:rPr lang="ko-KR" altLang="en-US" dirty="0" err="1" smtClean="0"/>
+              <a:rPr lang="ko-KR" altLang="en-US" dirty="0" err="1"/>
               <a:t>블럭</a:t>
             </a:r>
             <a:endParaRPr lang="ko-KR" altLang="en-US" dirty="0"/>
@@ -15829,11 +15783,11 @@
           <a:lstStyle/>
           <a:p>
             <a:r>
-              <a:rPr lang="ko-KR" altLang="en-US" smtClean="0"/>
+              <a:rPr lang="ko-KR" altLang="en-US"/>
               <a:t>회전의 중심 </a:t>
             </a:r>
             <a:r>
-              <a:rPr lang="ko-KR" altLang="en-US" dirty="0" err="1" smtClean="0"/>
+              <a:rPr lang="ko-KR" altLang="en-US" dirty="0" err="1"/>
               <a:t>블럭</a:t>
             </a:r>
             <a:endParaRPr lang="ko-KR" altLang="en-US" dirty="0"/>
@@ -15903,7 +15857,7 @@
           <a:lstStyle/>
           <a:p>
             <a:r>
-              <a:rPr lang="en-US" altLang="ko-KR" dirty="0" smtClean="0"/>
+              <a:rPr lang="en-US" altLang="ko-KR" dirty="0"/>
               <a:t>30 * 30</a:t>
             </a:r>
             <a:endParaRPr lang="ko-KR" altLang="en-US" dirty="0"/>
@@ -15963,14 +15917,13 @@
           <a:lstStyle/>
           <a:p>
             <a:r>
-              <a:rPr lang="ko-KR" altLang="en-US" smtClean="0"/>
+              <a:rPr lang="ko-KR" altLang="en-US"/>
               <a:t>카운팅</a:t>
             </a:r>
             <a:r>
-              <a:rPr lang="ko-KR" altLang="en-US" dirty="0" smtClean="0"/>
+              <a:rPr lang="ko-KR" altLang="en-US" dirty="0"/>
               <a:t> 영역</a:t>
             </a:r>
-            <a:endParaRPr lang="ko-KR" altLang="en-US" dirty="0"/>
           </a:p>
         </p:txBody>
       </p:sp>
@@ -16117,7 +16070,7 @@
               <a:p>
                 <a:pPr algn="ctr"/>
                 <a:r>
-                  <a:rPr lang="ko-KR" altLang="en-US" smtClean="0"/>
+                  <a:rPr lang="ko-KR" altLang="en-US"/>
                   <a:t>블럭</a:t>
                 </a:r>
                 <a:endParaRPr lang="ko-KR" altLang="en-US" dirty="0"/>
@@ -16202,26 +16155,22 @@
                 <a:pPr algn="ctr"/>
                 <a:r>
                   <a:rPr lang="ko-KR" altLang="en-US" dirty="0" err="1"/>
-                  <a:t>갯</a:t>
+                  <a:t>갯수</a:t>
                 </a:r>
                 <a:r>
-                  <a:rPr lang="ko-KR" altLang="en-US" dirty="0" err="1" smtClean="0"/>
-                  <a:t>수</a:t>
-                </a:r>
-                <a:r>
-                  <a:rPr lang="ko-KR" altLang="en-US" dirty="0" smtClean="0"/>
+                  <a:rPr lang="ko-KR" altLang="en-US" dirty="0"/>
                   <a:t>  </a:t>
                 </a:r>
                 <a:r>
-                  <a:rPr lang="en-US" altLang="ko-KR" dirty="0" smtClean="0"/>
+                  <a:rPr lang="en-US" altLang="ko-KR" dirty="0"/>
                   <a:t>( </a:t>
                 </a:r>
                 <a:r>
-                  <a:rPr lang="en-US" altLang="ko-KR" dirty="0" err="1" smtClean="0"/>
+                  <a:rPr lang="en-US" altLang="ko-KR" dirty="0" err="1"/>
                   <a:t>xx.x</a:t>
                 </a:r>
                 <a:r>
-                  <a:rPr lang="en-US" altLang="ko-KR" dirty="0" smtClean="0"/>
+                  <a:rPr lang="en-US" altLang="ko-KR" dirty="0"/>
                   <a:t>%)</a:t>
                 </a:r>
                 <a:endParaRPr lang="ko-KR" altLang="en-US" dirty="0"/>
@@ -16280,7 +16229,7 @@
               <a:p>
                 <a:pPr algn="ctr"/>
                 <a:r>
-                  <a:rPr lang="ko-KR" altLang="en-US" smtClean="0"/>
+                  <a:rPr lang="ko-KR" altLang="en-US"/>
                   <a:t>블럭</a:t>
                 </a:r>
                 <a:endParaRPr lang="ko-KR" altLang="en-US" dirty="0"/>
@@ -16365,26 +16314,22 @@
                 <a:pPr algn="ctr"/>
                 <a:r>
                   <a:rPr lang="ko-KR" altLang="en-US" dirty="0" err="1"/>
-                  <a:t>갯</a:t>
+                  <a:t>갯수</a:t>
                 </a:r>
                 <a:r>
-                  <a:rPr lang="ko-KR" altLang="en-US" dirty="0" err="1" smtClean="0"/>
-                  <a:t>수</a:t>
-                </a:r>
-                <a:r>
-                  <a:rPr lang="ko-KR" altLang="en-US" dirty="0" smtClean="0"/>
+                  <a:rPr lang="ko-KR" altLang="en-US" dirty="0"/>
                   <a:t>  </a:t>
                 </a:r>
                 <a:r>
-                  <a:rPr lang="en-US" altLang="ko-KR" dirty="0" smtClean="0"/>
+                  <a:rPr lang="en-US" altLang="ko-KR" dirty="0"/>
                   <a:t>( </a:t>
                 </a:r>
                 <a:r>
-                  <a:rPr lang="en-US" altLang="ko-KR" dirty="0" err="1" smtClean="0"/>
+                  <a:rPr lang="en-US" altLang="ko-KR" dirty="0" err="1"/>
                   <a:t>xx.x</a:t>
                 </a:r>
                 <a:r>
-                  <a:rPr lang="en-US" altLang="ko-KR" dirty="0" smtClean="0"/>
+                  <a:rPr lang="en-US" altLang="ko-KR" dirty="0"/>
                   <a:t>%)</a:t>
                 </a:r>
                 <a:endParaRPr lang="ko-KR" altLang="en-US" dirty="0"/>
@@ -16443,7 +16388,7 @@
               <a:p>
                 <a:pPr algn="ctr"/>
                 <a:r>
-                  <a:rPr lang="ko-KR" altLang="en-US" smtClean="0"/>
+                  <a:rPr lang="ko-KR" altLang="en-US"/>
                   <a:t>블럭</a:t>
                 </a:r>
                 <a:endParaRPr lang="ko-KR" altLang="en-US" dirty="0"/>
@@ -16528,26 +16473,22 @@
                 <a:pPr algn="ctr"/>
                 <a:r>
                   <a:rPr lang="ko-KR" altLang="en-US" dirty="0" err="1"/>
-                  <a:t>갯</a:t>
+                  <a:t>갯수</a:t>
                 </a:r>
                 <a:r>
-                  <a:rPr lang="ko-KR" altLang="en-US" dirty="0" err="1" smtClean="0"/>
-                  <a:t>수</a:t>
-                </a:r>
-                <a:r>
-                  <a:rPr lang="ko-KR" altLang="en-US" dirty="0" smtClean="0"/>
+                  <a:rPr lang="ko-KR" altLang="en-US" dirty="0"/>
                   <a:t>  </a:t>
                 </a:r>
                 <a:r>
-                  <a:rPr lang="en-US" altLang="ko-KR" dirty="0" smtClean="0"/>
+                  <a:rPr lang="en-US" altLang="ko-KR" dirty="0"/>
                   <a:t>( </a:t>
                 </a:r>
                 <a:r>
-                  <a:rPr lang="en-US" altLang="ko-KR" dirty="0" err="1" smtClean="0"/>
+                  <a:rPr lang="en-US" altLang="ko-KR" dirty="0" err="1"/>
                   <a:t>xx.x</a:t>
                 </a:r>
                 <a:r>
-                  <a:rPr lang="en-US" altLang="ko-KR" dirty="0" smtClean="0"/>
+                  <a:rPr lang="en-US" altLang="ko-KR" dirty="0"/>
                   <a:t>%)</a:t>
                 </a:r>
                 <a:endParaRPr lang="ko-KR" altLang="en-US" dirty="0"/>
@@ -16606,7 +16547,7 @@
               <a:p>
                 <a:pPr algn="ctr"/>
                 <a:r>
-                  <a:rPr lang="ko-KR" altLang="en-US" smtClean="0"/>
+                  <a:rPr lang="ko-KR" altLang="en-US"/>
                   <a:t>블럭</a:t>
                 </a:r>
                 <a:endParaRPr lang="ko-KR" altLang="en-US" dirty="0"/>
@@ -16691,26 +16632,22 @@
                 <a:pPr algn="ctr"/>
                 <a:r>
                   <a:rPr lang="ko-KR" altLang="en-US" dirty="0" err="1"/>
-                  <a:t>갯</a:t>
+                  <a:t>갯수</a:t>
                 </a:r>
                 <a:r>
-                  <a:rPr lang="ko-KR" altLang="en-US" dirty="0" err="1" smtClean="0"/>
-                  <a:t>수</a:t>
-                </a:r>
-                <a:r>
-                  <a:rPr lang="ko-KR" altLang="en-US" dirty="0" smtClean="0"/>
+                  <a:rPr lang="ko-KR" altLang="en-US" dirty="0"/>
                   <a:t>  </a:t>
                 </a:r>
                 <a:r>
-                  <a:rPr lang="en-US" altLang="ko-KR" dirty="0" smtClean="0"/>
+                  <a:rPr lang="en-US" altLang="ko-KR" dirty="0"/>
                   <a:t>( </a:t>
                 </a:r>
                 <a:r>
-                  <a:rPr lang="en-US" altLang="ko-KR" dirty="0" err="1" smtClean="0"/>
+                  <a:rPr lang="en-US" altLang="ko-KR" dirty="0" err="1"/>
                   <a:t>xx.x</a:t>
                 </a:r>
                 <a:r>
-                  <a:rPr lang="en-US" altLang="ko-KR" dirty="0" smtClean="0"/>
+                  <a:rPr lang="en-US" altLang="ko-KR" dirty="0"/>
                   <a:t>%)</a:t>
                 </a:r>
                 <a:endParaRPr lang="ko-KR" altLang="en-US" dirty="0"/>
@@ -16769,7 +16706,7 @@
               <a:p>
                 <a:pPr algn="ctr"/>
                 <a:r>
-                  <a:rPr lang="ko-KR" altLang="en-US" smtClean="0"/>
+                  <a:rPr lang="ko-KR" altLang="en-US"/>
                   <a:t>블럭</a:t>
                 </a:r>
                 <a:endParaRPr lang="ko-KR" altLang="en-US" dirty="0"/>
@@ -16854,26 +16791,22 @@
                 <a:pPr algn="ctr"/>
                 <a:r>
                   <a:rPr lang="ko-KR" altLang="en-US" dirty="0" err="1"/>
-                  <a:t>갯</a:t>
+                  <a:t>갯수</a:t>
                 </a:r>
                 <a:r>
-                  <a:rPr lang="ko-KR" altLang="en-US" dirty="0" err="1" smtClean="0"/>
-                  <a:t>수</a:t>
-                </a:r>
-                <a:r>
-                  <a:rPr lang="ko-KR" altLang="en-US" dirty="0" smtClean="0"/>
+                  <a:rPr lang="ko-KR" altLang="en-US" dirty="0"/>
                   <a:t>  </a:t>
                 </a:r>
                 <a:r>
-                  <a:rPr lang="en-US" altLang="ko-KR" dirty="0" smtClean="0"/>
+                  <a:rPr lang="en-US" altLang="ko-KR" dirty="0"/>
                   <a:t>( </a:t>
                 </a:r>
                 <a:r>
-                  <a:rPr lang="en-US" altLang="ko-KR" dirty="0" err="1" smtClean="0"/>
+                  <a:rPr lang="en-US" altLang="ko-KR" dirty="0" err="1"/>
                   <a:t>xx.x</a:t>
                 </a:r>
                 <a:r>
-                  <a:rPr lang="en-US" altLang="ko-KR" dirty="0" smtClean="0"/>
+                  <a:rPr lang="en-US" altLang="ko-KR" dirty="0"/>
                   <a:t>%)</a:t>
                 </a:r>
                 <a:endParaRPr lang="ko-KR" altLang="en-US" dirty="0"/>
@@ -16932,7 +16865,7 @@
               <a:p>
                 <a:pPr algn="ctr"/>
                 <a:r>
-                  <a:rPr lang="ko-KR" altLang="en-US" smtClean="0"/>
+                  <a:rPr lang="ko-KR" altLang="en-US"/>
                   <a:t>블럭</a:t>
                 </a:r>
                 <a:endParaRPr lang="ko-KR" altLang="en-US" dirty="0"/>
@@ -17017,26 +16950,22 @@
                 <a:pPr algn="ctr"/>
                 <a:r>
                   <a:rPr lang="ko-KR" altLang="en-US" dirty="0" err="1"/>
-                  <a:t>갯</a:t>
+                  <a:t>갯수</a:t>
                 </a:r>
                 <a:r>
-                  <a:rPr lang="ko-KR" altLang="en-US" dirty="0" err="1" smtClean="0"/>
-                  <a:t>수</a:t>
-                </a:r>
-                <a:r>
-                  <a:rPr lang="ko-KR" altLang="en-US" dirty="0" smtClean="0"/>
+                  <a:rPr lang="ko-KR" altLang="en-US" dirty="0"/>
                   <a:t>  </a:t>
                 </a:r>
                 <a:r>
-                  <a:rPr lang="en-US" altLang="ko-KR" dirty="0" smtClean="0"/>
+                  <a:rPr lang="en-US" altLang="ko-KR" dirty="0"/>
                   <a:t>( </a:t>
                 </a:r>
                 <a:r>
-                  <a:rPr lang="en-US" altLang="ko-KR" dirty="0" err="1" smtClean="0"/>
+                  <a:rPr lang="en-US" altLang="ko-KR" dirty="0" err="1"/>
                   <a:t>xx.x</a:t>
                 </a:r>
                 <a:r>
-                  <a:rPr lang="en-US" altLang="ko-KR" dirty="0" smtClean="0"/>
+                  <a:rPr lang="en-US" altLang="ko-KR" dirty="0"/>
                   <a:t>%)</a:t>
                 </a:r>
                 <a:endParaRPr lang="ko-KR" altLang="en-US" dirty="0"/>
@@ -18413,11 +18342,11 @@
           <a:lstStyle/>
           <a:p>
             <a:r>
-              <a:rPr lang="ko-KR" altLang="en-US" dirty="0" smtClean="0"/>
+              <a:rPr lang="ko-KR" altLang="en-US" dirty="0"/>
               <a:t>회전되는 </a:t>
             </a:r>
             <a:r>
-              <a:rPr lang="ko-KR" altLang="en-US" dirty="0" err="1" smtClean="0"/>
+              <a:rPr lang="ko-KR" altLang="en-US" dirty="0" err="1"/>
               <a:t>블럭</a:t>
             </a:r>
             <a:endParaRPr lang="ko-KR" altLang="en-US" dirty="0"/>
@@ -18447,11 +18376,11 @@
           <a:lstStyle/>
           <a:p>
             <a:r>
-              <a:rPr lang="ko-KR" altLang="en-US" smtClean="0"/>
+              <a:rPr lang="ko-KR" altLang="en-US"/>
               <a:t>회전의 중심 </a:t>
             </a:r>
             <a:r>
-              <a:rPr lang="ko-KR" altLang="en-US" dirty="0" err="1" smtClean="0"/>
+              <a:rPr lang="ko-KR" altLang="en-US" dirty="0" err="1"/>
               <a:t>블럭</a:t>
             </a:r>
             <a:endParaRPr lang="ko-KR" altLang="en-US" dirty="0"/>
@@ -18521,7 +18450,7 @@
           <a:lstStyle/>
           <a:p>
             <a:r>
-              <a:rPr lang="en-US" altLang="ko-KR" dirty="0" smtClean="0"/>
+              <a:rPr lang="en-US" altLang="ko-KR" dirty="0"/>
               <a:t>30 * 30</a:t>
             </a:r>
             <a:endParaRPr lang="ko-KR" altLang="en-US" dirty="0"/>
@@ -18581,7 +18510,7 @@
           <a:lstStyle/>
           <a:p>
             <a:r>
-              <a:rPr lang="ko-KR" altLang="en-US" smtClean="0"/>
+              <a:rPr lang="ko-KR" altLang="en-US"/>
               <a:t>기능</a:t>
             </a:r>
             <a:endParaRPr lang="ko-KR" altLang="en-US" dirty="0"/>
@@ -19956,11 +19885,11 @@
           <a:lstStyle/>
           <a:p>
             <a:r>
-              <a:rPr lang="ko-KR" altLang="en-US" dirty="0" smtClean="0"/>
+              <a:rPr lang="ko-KR" altLang="en-US" dirty="0"/>
               <a:t>회전되는 </a:t>
             </a:r>
             <a:r>
-              <a:rPr lang="ko-KR" altLang="en-US" dirty="0" err="1" smtClean="0"/>
+              <a:rPr lang="ko-KR" altLang="en-US" dirty="0" err="1"/>
               <a:t>블럭</a:t>
             </a:r>
             <a:endParaRPr lang="ko-KR" altLang="en-US" dirty="0"/>
@@ -19990,11 +19919,11 @@
           <a:lstStyle/>
           <a:p>
             <a:r>
-              <a:rPr lang="ko-KR" altLang="en-US" smtClean="0"/>
+              <a:rPr lang="ko-KR" altLang="en-US"/>
               <a:t>회전의 중심 </a:t>
             </a:r>
             <a:r>
-              <a:rPr lang="ko-KR" altLang="en-US" dirty="0" err="1" smtClean="0"/>
+              <a:rPr lang="ko-KR" altLang="en-US" dirty="0" err="1"/>
               <a:t>블럭</a:t>
             </a:r>
             <a:endParaRPr lang="ko-KR" altLang="en-US" dirty="0"/>
@@ -20064,7 +19993,7 @@
           <a:lstStyle/>
           <a:p>
             <a:r>
-              <a:rPr lang="en-US" altLang="ko-KR" dirty="0" smtClean="0"/>
+              <a:rPr lang="en-US" altLang="ko-KR" dirty="0"/>
               <a:t>30 * 30</a:t>
             </a:r>
             <a:endParaRPr lang="ko-KR" altLang="en-US" dirty="0"/>
@@ -20098,10 +20027,10 @@
               <a:buChar char="•"/>
             </a:pPr>
             <a:r>
-              <a:rPr lang="ko-KR" altLang="en-US" sz="1400" b="1" dirty="0" smtClean="0"/>
+              <a:rPr lang="ko-KR" altLang="en-US" sz="1400" b="1" dirty="0"/>
               <a:t>블록 이동</a:t>
             </a:r>
-            <a:endParaRPr lang="en-US" altLang="ko-KR" sz="1400" b="1" dirty="0" smtClean="0"/>
+            <a:endParaRPr lang="en-US" altLang="ko-KR" sz="1400" b="1" dirty="0"/>
           </a:p>
           <a:p>
             <a:pPr marL="742950" lvl="1" indent="-285750">
@@ -20109,51 +20038,51 @@
               <a:buChar char="•"/>
             </a:pPr>
             <a:r>
-              <a:rPr lang="en-US" altLang="ko-KR" sz="1400" dirty="0" smtClean="0"/>
+              <a:rPr lang="en-US" altLang="ko-KR" sz="1400" dirty="0"/>
               <a:t>Key </a:t>
             </a:r>
             <a:r>
-              <a:rPr lang="ko-KR" altLang="en-US" sz="1400" dirty="0" smtClean="0"/>
+              <a:rPr lang="ko-KR" altLang="en-US" sz="1400" dirty="0"/>
               <a:t>입력 </a:t>
             </a:r>
             <a:r>
-              <a:rPr lang="en-US" altLang="ko-KR" sz="1400" dirty="0" smtClean="0"/>
+              <a:rPr lang="en-US" altLang="ko-KR" sz="1400" dirty="0"/>
               <a:t>: </a:t>
             </a:r>
             <a:r>
-              <a:rPr lang="ko-KR" altLang="en-US" sz="1400" dirty="0" smtClean="0"/>
+              <a:rPr lang="ko-KR" altLang="en-US" sz="1400" dirty="0"/>
               <a:t>← </a:t>
             </a:r>
             <a:r>
-              <a:rPr lang="en-US" altLang="ko-KR" sz="1400" dirty="0" smtClean="0"/>
+              <a:rPr lang="en-US" altLang="ko-KR" sz="1400" dirty="0"/>
               <a:t>(</a:t>
             </a:r>
             <a:r>
-              <a:rPr lang="ko-KR" altLang="en-US" sz="1400" dirty="0" err="1" smtClean="0"/>
+              <a:rPr lang="ko-KR" altLang="en-US" sz="1400" dirty="0" err="1"/>
               <a:t>화상표</a:t>
             </a:r>
             <a:r>
-              <a:rPr lang="ko-KR" altLang="en-US" sz="1400" dirty="0" smtClean="0"/>
+              <a:rPr lang="ko-KR" altLang="en-US" sz="1400" dirty="0"/>
               <a:t> 좌</a:t>
             </a:r>
             <a:r>
-              <a:rPr lang="en-US" altLang="ko-KR" sz="1400" dirty="0" smtClean="0"/>
+              <a:rPr lang="en-US" altLang="ko-KR" sz="1400" dirty="0"/>
               <a:t>) </a:t>
             </a:r>
             <a:r>
-              <a:rPr lang="ko-KR" altLang="en-US" sz="1400" dirty="0" smtClean="0"/>
+              <a:rPr lang="ko-KR" altLang="en-US" sz="1400" dirty="0"/>
               <a:t>또는 → </a:t>
             </a:r>
             <a:r>
-              <a:rPr lang="en-US" altLang="ko-KR" sz="1400" dirty="0" smtClean="0"/>
+              <a:rPr lang="en-US" altLang="ko-KR" sz="1400" dirty="0"/>
               <a:t>(</a:t>
             </a:r>
             <a:r>
-              <a:rPr lang="ko-KR" altLang="en-US" sz="1400" dirty="0" smtClean="0"/>
+              <a:rPr lang="ko-KR" altLang="en-US" sz="1400" dirty="0"/>
               <a:t>화살표 우</a:t>
             </a:r>
             <a:r>
-              <a:rPr lang="en-US" altLang="ko-KR" sz="1400" dirty="0" smtClean="0"/>
+              <a:rPr lang="en-US" altLang="ko-KR" sz="1400" dirty="0"/>
               <a:t>)</a:t>
             </a:r>
           </a:p>
@@ -20163,11 +20092,11 @@
               <a:buChar char="•"/>
             </a:pPr>
             <a:r>
-              <a:rPr lang="ko-KR" altLang="en-US" sz="1400" dirty="0" smtClean="0"/>
+              <a:rPr lang="ko-KR" altLang="en-US" sz="1400" dirty="0"/>
               <a:t>기능의 실행 </a:t>
             </a:r>
             <a:r>
-              <a:rPr lang="en-US" altLang="ko-KR" sz="1400" dirty="0" smtClean="0"/>
+              <a:rPr lang="en-US" altLang="ko-KR" sz="1400" dirty="0"/>
               <a:t>: </a:t>
             </a:r>
           </a:p>
@@ -20177,27 +20106,27 @@
               <a:buChar char="•"/>
             </a:pPr>
             <a:r>
-              <a:rPr lang="ko-KR" altLang="en-US" sz="1400" dirty="0" smtClean="0"/>
+              <a:rPr lang="ko-KR" altLang="en-US" sz="1400" dirty="0"/>
               <a:t>입력된 </a:t>
             </a:r>
             <a:r>
-              <a:rPr lang="en-US" altLang="ko-KR" sz="1400" dirty="0" smtClean="0"/>
+              <a:rPr lang="en-US" altLang="ko-KR" sz="1400" dirty="0"/>
               <a:t>Key</a:t>
             </a:r>
             <a:r>
-              <a:rPr lang="ko-KR" altLang="en-US" sz="1400" dirty="0" smtClean="0"/>
+              <a:rPr lang="ko-KR" altLang="en-US" sz="1400" dirty="0"/>
               <a:t>에 따라 왼쪽 또는 오른쪽으로 </a:t>
             </a:r>
             <a:r>
-              <a:rPr lang="en-US" altLang="ko-KR" sz="1400" dirty="0" smtClean="0"/>
+              <a:rPr lang="en-US" altLang="ko-KR" sz="1400" dirty="0"/>
               <a:t>1</a:t>
             </a:r>
             <a:r>
-              <a:rPr lang="ko-KR" altLang="en-US" sz="1400" dirty="0" smtClean="0"/>
+              <a:rPr lang="ko-KR" altLang="en-US" sz="1400" dirty="0"/>
               <a:t>칸 이동한다</a:t>
             </a:r>
             <a:r>
-              <a:rPr lang="en-US" altLang="ko-KR" sz="1400" dirty="0" smtClean="0"/>
+              <a:rPr lang="en-US" altLang="ko-KR" sz="1400" dirty="0"/>
               <a:t>.</a:t>
             </a:r>
           </a:p>
@@ -20207,178 +20136,11 @@
               <a:buChar char="•"/>
             </a:pPr>
             <a:r>
-              <a:rPr lang="ko-KR" altLang="en-US" sz="1400" dirty="0" smtClean="0"/>
+              <a:rPr lang="ko-KR" altLang="en-US" sz="1400" dirty="0"/>
               <a:t>왼쪽 끝 또는 오른쪽 끝에 닿을 경우 더 이상 이동하지 않는다</a:t>
             </a:r>
             <a:r>
-              <a:rPr lang="en-US" altLang="ko-KR" sz="1400" dirty="0" smtClean="0"/>
-              <a:t>.</a:t>
-            </a:r>
-          </a:p>
-          <a:p>
-            <a:pPr marL="285750" indent="-285750">
-              <a:buFont typeface="Arial" panose="020B0604020202020204" pitchFamily="34" charset="0"/>
-              <a:buChar char="•"/>
-            </a:pPr>
-            <a:endParaRPr lang="en-US" altLang="ko-KR" sz="1400" dirty="0" smtClean="0"/>
-          </a:p>
-          <a:p>
-            <a:pPr marL="285750" indent="-285750">
-              <a:buFont typeface="Arial" panose="020B0604020202020204" pitchFamily="34" charset="0"/>
-              <a:buChar char="•"/>
-            </a:pPr>
-            <a:r>
-              <a:rPr lang="ko-KR" altLang="en-US" sz="1400" b="1" dirty="0" smtClean="0"/>
-              <a:t>회전</a:t>
-            </a:r>
-            <a:endParaRPr lang="en-US" altLang="ko-KR" sz="1400" b="1" dirty="0" smtClean="0"/>
-          </a:p>
-          <a:p>
-            <a:pPr marL="742950" lvl="1" indent="-285750">
-              <a:buFont typeface="Arial" panose="020B0604020202020204" pitchFamily="34" charset="0"/>
-              <a:buChar char="•"/>
-            </a:pPr>
-            <a:r>
-              <a:rPr lang="en-US" altLang="ko-KR" sz="1400" dirty="0" smtClean="0"/>
-              <a:t>Key</a:t>
-            </a:r>
-            <a:r>
-              <a:rPr lang="ko-KR" altLang="en-US" sz="1400" dirty="0" smtClean="0"/>
-              <a:t> 입력 </a:t>
-            </a:r>
-            <a:r>
-              <a:rPr lang="en-US" altLang="ko-KR" sz="1400" dirty="0" smtClean="0"/>
-              <a:t>: </a:t>
-            </a:r>
-            <a:r>
-              <a:rPr lang="ko-KR" altLang="en-US" sz="1400" dirty="0" smtClean="0"/>
-              <a:t>↑ </a:t>
-            </a:r>
-            <a:r>
-              <a:rPr lang="en-US" altLang="ko-KR" sz="1400" dirty="0" smtClean="0"/>
-              <a:t>(</a:t>
-            </a:r>
-            <a:r>
-              <a:rPr lang="ko-KR" altLang="en-US" sz="1400" dirty="0" smtClean="0"/>
-              <a:t>화살표 위</a:t>
-            </a:r>
-            <a:r>
-              <a:rPr lang="en-US" altLang="ko-KR" sz="1400" dirty="0" smtClean="0"/>
-              <a:t>) </a:t>
-            </a:r>
-          </a:p>
-          <a:p>
-            <a:pPr marL="742950" lvl="1" indent="-285750">
-              <a:buFont typeface="Arial" panose="020B0604020202020204" pitchFamily="34" charset="0"/>
-              <a:buChar char="•"/>
-            </a:pPr>
-            <a:r>
-              <a:rPr lang="ko-KR" altLang="en-US" sz="1400" dirty="0" smtClean="0"/>
-              <a:t>기능의</a:t>
-            </a:r>
-            <a:r>
-              <a:rPr lang="en-US" altLang="ko-KR" sz="1400" dirty="0" smtClean="0"/>
-              <a:t> </a:t>
-            </a:r>
-            <a:r>
-              <a:rPr lang="ko-KR" altLang="en-US" sz="1400" dirty="0" smtClean="0"/>
-              <a:t>실행 </a:t>
-            </a:r>
-            <a:r>
-              <a:rPr lang="en-US" altLang="ko-KR" sz="1400" dirty="0" smtClean="0"/>
-              <a:t>: </a:t>
-            </a:r>
-          </a:p>
-          <a:p>
-            <a:pPr marL="1200150" lvl="2" indent="-285750">
-              <a:buFont typeface="Arial" panose="020B0604020202020204" pitchFamily="34" charset="0"/>
-              <a:buChar char="•"/>
-            </a:pPr>
-            <a:r>
-              <a:rPr lang="en-US" altLang="ko-KR" sz="1400" dirty="0" smtClean="0"/>
-              <a:t>Key </a:t>
-            </a:r>
-            <a:r>
-              <a:rPr lang="ko-KR" altLang="en-US" sz="1400" dirty="0" smtClean="0"/>
-              <a:t>입력 시</a:t>
-            </a:r>
-            <a:r>
-              <a:rPr lang="en-US" altLang="ko-KR" sz="1400" dirty="0" smtClean="0"/>
-              <a:t>, </a:t>
-            </a:r>
-            <a:r>
-              <a:rPr lang="ko-KR" altLang="en-US" sz="1400" dirty="0" smtClean="0"/>
-              <a:t>회전의 중심 블록을 기준으로 시계</a:t>
-            </a:r>
-            <a:r>
-              <a:rPr lang="en-US" altLang="ko-KR" sz="1400" dirty="0" smtClean="0"/>
-              <a:t>(</a:t>
-            </a:r>
-            <a:r>
-              <a:rPr lang="ko-KR" altLang="en-US" sz="1400" dirty="0" smtClean="0"/>
-              <a:t>↑</a:t>
-            </a:r>
-            <a:r>
-              <a:rPr lang="en-US" altLang="ko-KR" sz="1400" dirty="0" smtClean="0"/>
-              <a:t>)</a:t>
-            </a:r>
-            <a:r>
-              <a:rPr lang="ko-KR" altLang="en-US" sz="1400" dirty="0" smtClean="0"/>
-              <a:t> 방향으로 </a:t>
-            </a:r>
-            <a:r>
-              <a:rPr lang="en-US" altLang="ko-KR" sz="1400" dirty="0" smtClean="0"/>
-              <a:t/>
-            </a:r>
-            <a:br>
-              <a:rPr lang="en-US" altLang="ko-KR" sz="1400" dirty="0" smtClean="0"/>
-            </a:br>
-            <a:r>
-              <a:rPr lang="en-US" altLang="ko-KR" sz="1400" dirty="0" smtClean="0"/>
-              <a:t>90</a:t>
-            </a:r>
-            <a:r>
-              <a:rPr lang="ko-KR" altLang="en-US" sz="1400" dirty="0" smtClean="0"/>
-              <a:t>도 회전시킨다</a:t>
-            </a:r>
-            <a:r>
-              <a:rPr lang="en-US" altLang="ko-KR" sz="1400" dirty="0" smtClean="0"/>
-              <a:t>.</a:t>
-            </a:r>
-          </a:p>
-          <a:p>
-            <a:pPr marL="1200150" lvl="2" indent="-285750">
-              <a:buFont typeface="Arial" panose="020B0604020202020204" pitchFamily="34" charset="0"/>
-              <a:buChar char="•"/>
-            </a:pPr>
-            <a:r>
-              <a:rPr lang="ko-KR" altLang="en-US" sz="1400" dirty="0" smtClean="0"/>
-              <a:t>회전의 중심 블록은 회전하지 않는다</a:t>
-            </a:r>
-            <a:r>
-              <a:rPr lang="en-US" altLang="ko-KR" sz="1400" dirty="0" smtClean="0"/>
-              <a:t>.</a:t>
-            </a:r>
-          </a:p>
-          <a:p>
-            <a:pPr marL="1200150" lvl="2" indent="-285750">
-              <a:buFont typeface="Arial" panose="020B0604020202020204" pitchFamily="34" charset="0"/>
-              <a:buChar char="•"/>
-            </a:pPr>
-            <a:r>
-              <a:rPr lang="ko-KR" altLang="en-US" sz="1400" dirty="0" smtClean="0"/>
-              <a:t>회전 불가한 블록일 경우</a:t>
-            </a:r>
-            <a:r>
-              <a:rPr lang="en-US" altLang="ko-KR" sz="1400" dirty="0" smtClean="0"/>
-              <a:t>, </a:t>
-            </a:r>
-            <a:r>
-              <a:rPr lang="ko-KR" altLang="en-US" sz="1400" dirty="0" smtClean="0"/>
-              <a:t>회전하지 않는다</a:t>
-            </a:r>
-            <a:r>
-              <a:rPr lang="en-US" altLang="ko-KR" sz="1400" dirty="0" smtClean="0"/>
+              <a:rPr lang="en-US" altLang="ko-KR" sz="1400" dirty="0"/>
               <a:t>.</a:t>
             </a:r>
           </a:p>
@@ -20395,10 +20157,10 @@
               <a:buChar char="•"/>
             </a:pPr>
             <a:r>
-              <a:rPr lang="ko-KR" altLang="en-US" sz="1400" b="1" dirty="0" smtClean="0"/>
-              <a:t>빠르게 내리기</a:t>
-            </a:r>
-            <a:endParaRPr lang="en-US" altLang="ko-KR" sz="1400" b="1" dirty="0" smtClean="0"/>
+              <a:rPr lang="ko-KR" altLang="en-US" sz="1400" b="1" dirty="0"/>
+              <a:t>회전</a:t>
+            </a:r>
+            <a:endParaRPr lang="en-US" altLang="ko-KR" sz="1400" b="1" dirty="0"/>
           </a:p>
           <a:p>
             <a:pPr marL="742950" lvl="1" indent="-285750">
@@ -20406,32 +20168,32 @@
               <a:buChar char="•"/>
             </a:pPr>
             <a:r>
-              <a:rPr lang="en-US" altLang="ko-KR" sz="1400" dirty="0" smtClean="0"/>
+              <a:rPr lang="en-US" altLang="ko-KR" sz="1400" dirty="0"/>
               <a:t>Key</a:t>
             </a:r>
             <a:r>
-              <a:rPr lang="ko-KR" altLang="en-US" sz="1400" dirty="0" smtClean="0"/>
+              <a:rPr lang="ko-KR" altLang="en-US" sz="1400" dirty="0"/>
               <a:t> 입력 </a:t>
             </a:r>
             <a:r>
-              <a:rPr lang="en-US" altLang="ko-KR" sz="1400" dirty="0" smtClean="0"/>
+              <a:rPr lang="en-US" altLang="ko-KR" sz="1400" dirty="0"/>
               <a:t>: </a:t>
             </a:r>
             <a:r>
-              <a:rPr lang="ko-KR" altLang="en-US" sz="1400" dirty="0" smtClean="0"/>
-              <a:t>↓ </a:t>
-            </a:r>
-            <a:r>
-              <a:rPr lang="en-US" altLang="ko-KR" sz="1400" dirty="0" smtClean="0"/>
+              <a:rPr lang="ko-KR" altLang="en-US" sz="1400" dirty="0"/>
+              <a:t>↑ </a:t>
+            </a:r>
+            <a:r>
+              <a:rPr lang="en-US" altLang="ko-KR" sz="1400" dirty="0"/>
               <a:t>(</a:t>
             </a:r>
             <a:r>
-              <a:rPr lang="ko-KR" altLang="en-US" sz="1400" dirty="0" smtClean="0"/>
-              <a:t>화살표 아래</a:t>
-            </a:r>
-            <a:r>
-              <a:rPr lang="en-US" altLang="ko-KR" sz="1400" dirty="0" smtClean="0"/>
-              <a:t>)</a:t>
+              <a:rPr lang="ko-KR" altLang="en-US" sz="1400" dirty="0"/>
+              <a:t>화살표 위</a:t>
+            </a:r>
+            <a:r>
+              <a:rPr lang="en-US" altLang="ko-KR" sz="1400" dirty="0"/>
+              <a:t>) </a:t>
             </a:r>
           </a:p>
           <a:p>
@@ -20440,12 +20202,20 @@
               <a:buChar char="•"/>
             </a:pPr>
             <a:r>
-              <a:rPr lang="ko-KR" altLang="en-US" sz="1400" dirty="0" smtClean="0"/>
-              <a:t>기능의 실행 </a:t>
-            </a:r>
-            <a:r>
-              <a:rPr lang="en-US" altLang="ko-KR" sz="1400" dirty="0" smtClean="0"/>
-              <a:t>:</a:t>
+              <a:rPr lang="ko-KR" altLang="en-US" sz="1400" dirty="0"/>
+              <a:t>기능의</a:t>
+            </a:r>
+            <a:r>
+              <a:rPr lang="en-US" altLang="ko-KR" sz="1400" dirty="0"/>
+              <a:t> </a:t>
+            </a:r>
+            <a:r>
+              <a:rPr lang="ko-KR" altLang="en-US" sz="1400" dirty="0"/>
+              <a:t>실행 </a:t>
+            </a:r>
+            <a:r>
+              <a:rPr lang="en-US" altLang="ko-KR" sz="1400" dirty="0"/>
+              <a:t>: </a:t>
             </a:r>
           </a:p>
           <a:p>
@@ -20454,23 +20224,50 @@
               <a:buChar char="•"/>
             </a:pPr>
             <a:r>
-              <a:rPr lang="en-US" altLang="ko-KR" sz="1400" dirty="0" smtClean="0"/>
+              <a:rPr lang="en-US" altLang="ko-KR" sz="1400" dirty="0"/>
               <a:t>Key </a:t>
             </a:r>
             <a:r>
-              <a:rPr lang="ko-KR" altLang="en-US" sz="1400" dirty="0" smtClean="0"/>
+              <a:rPr lang="ko-KR" altLang="en-US" sz="1400" dirty="0"/>
               <a:t>입력 시</a:t>
             </a:r>
             <a:r>
-              <a:rPr lang="en-US" altLang="ko-KR" sz="1400" dirty="0" smtClean="0"/>
+              <a:rPr lang="en-US" altLang="ko-KR" sz="1400" dirty="0"/>
               <a:t>, </a:t>
             </a:r>
             <a:r>
-              <a:rPr lang="ko-KR" altLang="en-US" sz="1400" dirty="0" smtClean="0"/>
-              <a:t>바로 한 칸 아래로 내린다</a:t>
-            </a:r>
-            <a:r>
-              <a:rPr lang="en-US" altLang="ko-KR" sz="1400" dirty="0" smtClean="0"/>
+              <a:rPr lang="ko-KR" altLang="en-US" sz="1400" dirty="0"/>
+              <a:t>회전의 중심 블록을 기준으로 시계</a:t>
+            </a:r>
+            <a:r>
+              <a:rPr lang="en-US" altLang="ko-KR" sz="1400" dirty="0"/>
+              <a:t>(</a:t>
+            </a:r>
+            <a:r>
+              <a:rPr lang="ko-KR" altLang="en-US" sz="1400" dirty="0"/>
+              <a:t>↑</a:t>
+            </a:r>
+            <a:r>
+              <a:rPr lang="en-US" altLang="ko-KR" sz="1400" dirty="0"/>
+              <a:t>)</a:t>
+            </a:r>
+            <a:r>
+              <a:rPr lang="ko-KR" altLang="en-US" sz="1400" dirty="0"/>
+              <a:t> 방향으로 </a:t>
+            </a:r>
+            <a:br>
+              <a:rPr lang="en-US" altLang="ko-KR" sz="1400" dirty="0"/>
+            </a:br>
+            <a:r>
+              <a:rPr lang="en-US" altLang="ko-KR" sz="1400" dirty="0"/>
+              <a:t>90</a:t>
+            </a:r>
+            <a:r>
+              <a:rPr lang="ko-KR" altLang="en-US" sz="1400" dirty="0"/>
+              <a:t>도 회전시킨다</a:t>
+            </a:r>
+            <a:r>
+              <a:rPr lang="en-US" altLang="ko-KR" sz="1400" dirty="0"/>
               <a:t>.</a:t>
             </a:r>
           </a:p>
@@ -20480,20 +20277,34 @@
               <a:buChar char="•"/>
             </a:pPr>
             <a:r>
-              <a:rPr lang="ko-KR" altLang="en-US" sz="1400" dirty="0" smtClean="0"/>
-              <a:t>키가 계속 눌려있다면 연속으로 내려간다</a:t>
-            </a:r>
-            <a:r>
-              <a:rPr lang="en-US" altLang="ko-KR" sz="1400" dirty="0" smtClean="0"/>
-              <a:t>. (</a:t>
-            </a:r>
-            <a:r>
-              <a:rPr lang="ko-KR" altLang="en-US" sz="1400" dirty="0" smtClean="0"/>
-              <a:t>대기 시간 있음</a:t>
-            </a:r>
-            <a:r>
-              <a:rPr lang="en-US" altLang="ko-KR" sz="1400" dirty="0" smtClean="0"/>
-              <a:t>)</a:t>
+              <a:rPr lang="ko-KR" altLang="en-US" sz="1400" dirty="0"/>
+              <a:t>회전의 중심 블록은 회전하지 않는다</a:t>
+            </a:r>
+            <a:r>
+              <a:rPr lang="en-US" altLang="ko-KR" sz="1400" dirty="0"/>
+              <a:t>.</a:t>
+            </a:r>
+          </a:p>
+          <a:p>
+            <a:pPr marL="1200150" lvl="2" indent="-285750">
+              <a:buFont typeface="Arial" panose="020B0604020202020204" pitchFamily="34" charset="0"/>
+              <a:buChar char="•"/>
+            </a:pPr>
+            <a:r>
+              <a:rPr lang="ko-KR" altLang="en-US" sz="1400" dirty="0"/>
+              <a:t>회전 불가한 블록일 경우</a:t>
+            </a:r>
+            <a:r>
+              <a:rPr lang="en-US" altLang="ko-KR" sz="1400" dirty="0"/>
+              <a:t>, </a:t>
+            </a:r>
+            <a:r>
+              <a:rPr lang="ko-KR" altLang="en-US" sz="1400" dirty="0"/>
+              <a:t>회전하지 않는다</a:t>
+            </a:r>
+            <a:r>
+              <a:rPr lang="en-US" altLang="ko-KR" sz="1400" dirty="0"/>
+              <a:t>.</a:t>
             </a:r>
           </a:p>
           <a:p>
@@ -20509,10 +20320,10 @@
               <a:buChar char="•"/>
             </a:pPr>
             <a:r>
-              <a:rPr lang="ko-KR" altLang="en-US" sz="1400" b="1" dirty="0" smtClean="0"/>
-              <a:t>강제 내리기</a:t>
-            </a:r>
-            <a:endParaRPr lang="en-US" altLang="ko-KR" sz="1400" b="1" dirty="0" smtClean="0"/>
+              <a:rPr lang="ko-KR" altLang="en-US" sz="1400" b="1" dirty="0"/>
+              <a:t>빠르게 내리기</a:t>
+            </a:r>
+            <a:endParaRPr lang="en-US" altLang="ko-KR" sz="1400" b="1" dirty="0"/>
           </a:p>
           <a:p>
             <a:pPr marL="742950" lvl="1" indent="-285750">
@@ -20520,34 +20331,33 @@
               <a:buChar char="•"/>
             </a:pPr>
             <a:r>
-              <a:rPr lang="en-US" altLang="ko-KR" sz="1400" dirty="0" smtClean="0"/>
-              <a:t>Key </a:t>
-            </a:r>
-            <a:r>
-              <a:rPr lang="ko-KR" altLang="en-US" sz="1400" dirty="0" smtClean="0"/>
-              <a:t>입력 </a:t>
-            </a:r>
-            <a:r>
-              <a:rPr lang="en-US" altLang="ko-KR" sz="1400" dirty="0" smtClean="0"/>
-              <a:t>: Space Bar (</a:t>
-            </a:r>
-            <a:r>
-              <a:rPr lang="ko-KR" altLang="en-US" sz="1400" dirty="0" smtClean="0"/>
-              <a:t>스페이스</a:t>
-            </a:r>
-            <a:r>
-              <a:rPr lang="en-US" altLang="ko-KR" sz="1400" dirty="0" smtClean="0"/>
-              <a:t> </a:t>
-            </a:r>
-            <a:r>
-              <a:rPr lang="ko-KR" altLang="en-US" sz="1400" dirty="0" smtClean="0"/>
-              <a:t>바</a:t>
-            </a:r>
-            <a:r>
-              <a:rPr lang="en-US" altLang="ko-KR" sz="1400" dirty="0" smtClean="0"/>
+              <a:rPr lang="en-US" altLang="ko-KR" sz="1400" dirty="0"/>
+              <a:t>Key</a:t>
+            </a:r>
+            <a:r>
+              <a:rPr lang="ko-KR" altLang="en-US" sz="1400" dirty="0"/>
+              <a:t> 입력 </a:t>
+            </a:r>
+            <a:r>
+              <a:rPr lang="en-US" altLang="ko-KR" sz="1400" dirty="0"/>
+              <a:t>: </a:t>
+            </a:r>
+            <a:r>
+              <a:rPr lang="ko-KR" altLang="en-US" sz="1400" dirty="0"/>
+              <a:t>↓ </a:t>
+            </a:r>
+            <a:r>
+              <a:rPr lang="en-US" altLang="ko-KR" sz="1400" dirty="0"/>
+              <a:t>(</a:t>
+            </a:r>
+            <a:r>
+              <a:rPr lang="ko-KR" altLang="en-US" sz="1400" dirty="0"/>
+              <a:t>화살표 아래</a:t>
+            </a:r>
+            <a:r>
+              <a:rPr lang="en-US" altLang="ko-KR" sz="1400" dirty="0"/>
               <a:t>)</a:t>
             </a:r>
-            <a:endParaRPr lang="en-US" altLang="ko-KR" sz="1400" dirty="0"/>
           </a:p>
           <a:p>
             <a:pPr marL="742950" lvl="1" indent="-285750">
@@ -20555,12 +20365,12 @@
               <a:buChar char="•"/>
             </a:pPr>
             <a:r>
-              <a:rPr lang="ko-KR" altLang="en-US" sz="1400" dirty="0" smtClean="0"/>
+              <a:rPr lang="ko-KR" altLang="en-US" sz="1400" dirty="0"/>
               <a:t>기능의 실행 </a:t>
             </a:r>
             <a:r>
-              <a:rPr lang="en-US" altLang="ko-KR" sz="1400" dirty="0" smtClean="0"/>
-              <a:t>: </a:t>
+              <a:rPr lang="en-US" altLang="ko-KR" sz="1400" dirty="0"/>
+              <a:t>:</a:t>
             </a:r>
           </a:p>
           <a:p>
@@ -20569,19 +20379,23 @@
               <a:buChar char="•"/>
             </a:pPr>
             <a:r>
-              <a:rPr lang="ko-KR" altLang="en-US" sz="1400" dirty="0" smtClean="0"/>
-              <a:t>키 입력 시</a:t>
-            </a:r>
-            <a:r>
-              <a:rPr lang="en-US" altLang="ko-KR" sz="1400" dirty="0" smtClean="0"/>
+              <a:rPr lang="en-US" altLang="ko-KR" sz="1400" dirty="0"/>
+              <a:t>Key </a:t>
+            </a:r>
+            <a:r>
+              <a:rPr lang="ko-KR" altLang="en-US" sz="1400" dirty="0"/>
+              <a:t>입력 시</a:t>
+            </a:r>
+            <a:r>
+              <a:rPr lang="en-US" altLang="ko-KR" sz="1400" dirty="0"/>
               <a:t>, </a:t>
             </a:r>
             <a:r>
-              <a:rPr lang="ko-KR" altLang="en-US" sz="1400" dirty="0" smtClean="0"/>
-              <a:t>현재 위치에서 바닥을 향해 즉시 이동한다</a:t>
-            </a:r>
-            <a:r>
-              <a:rPr lang="en-US" altLang="ko-KR" sz="1400" dirty="0" smtClean="0"/>
+              <a:rPr lang="ko-KR" altLang="en-US" sz="1400" dirty="0"/>
+              <a:t>바로 한 칸 아래로 내린다</a:t>
+            </a:r>
+            <a:r>
+              <a:rPr lang="en-US" altLang="ko-KR" sz="1400" dirty="0"/>
               <a:t>.</a:t>
             </a:r>
           </a:p>
@@ -20591,19 +20405,129 @@
               <a:buChar char="•"/>
             </a:pPr>
             <a:r>
-              <a:rPr lang="ko-KR" altLang="en-US" sz="1400" dirty="0" smtClean="0"/>
+              <a:rPr lang="ko-KR" altLang="en-US" sz="1400" dirty="0"/>
+              <a:t>키가 계속 눌려있다면 연속으로 내려간다</a:t>
+            </a:r>
+            <a:r>
+              <a:rPr lang="en-US" altLang="ko-KR" sz="1400" dirty="0"/>
+              <a:t>. (</a:t>
+            </a:r>
+            <a:r>
+              <a:rPr lang="ko-KR" altLang="en-US" sz="1400" dirty="0"/>
+              <a:t>대기 시간 있음</a:t>
+            </a:r>
+            <a:r>
+              <a:rPr lang="en-US" altLang="ko-KR" sz="1400" dirty="0"/>
+              <a:t>)</a:t>
+            </a:r>
+          </a:p>
+          <a:p>
+            <a:pPr marL="285750" indent="-285750">
+              <a:buFont typeface="Arial" panose="020B0604020202020204" pitchFamily="34" charset="0"/>
+              <a:buChar char="•"/>
+            </a:pPr>
+            <a:endParaRPr lang="en-US" altLang="ko-KR" sz="1400" dirty="0"/>
+          </a:p>
+          <a:p>
+            <a:pPr marL="285750" indent="-285750">
+              <a:buFont typeface="Arial" panose="020B0604020202020204" pitchFamily="34" charset="0"/>
+              <a:buChar char="•"/>
+            </a:pPr>
+            <a:r>
+              <a:rPr lang="ko-KR" altLang="en-US" sz="1400" b="1" dirty="0"/>
+              <a:t>강제 내리기</a:t>
+            </a:r>
+            <a:endParaRPr lang="en-US" altLang="ko-KR" sz="1400" b="1" dirty="0"/>
+          </a:p>
+          <a:p>
+            <a:pPr marL="742950" lvl="1" indent="-285750">
+              <a:buFont typeface="Arial" panose="020B0604020202020204" pitchFamily="34" charset="0"/>
+              <a:buChar char="•"/>
+            </a:pPr>
+            <a:r>
+              <a:rPr lang="en-US" altLang="ko-KR" sz="1400" dirty="0"/>
+              <a:t>Key </a:t>
+            </a:r>
+            <a:r>
+              <a:rPr lang="ko-KR" altLang="en-US" sz="1400" dirty="0"/>
+              <a:t>입력 </a:t>
+            </a:r>
+            <a:r>
+              <a:rPr lang="en-US" altLang="ko-KR" sz="1400" dirty="0"/>
+              <a:t>: Space Bar (</a:t>
+            </a:r>
+            <a:r>
+              <a:rPr lang="ko-KR" altLang="en-US" sz="1400" dirty="0"/>
+              <a:t>스페이스</a:t>
+            </a:r>
+            <a:r>
+              <a:rPr lang="en-US" altLang="ko-KR" sz="1400" dirty="0"/>
+              <a:t> </a:t>
+            </a:r>
+            <a:r>
+              <a:rPr lang="ko-KR" altLang="en-US" sz="1400" dirty="0"/>
+              <a:t>바</a:t>
+            </a:r>
+            <a:r>
+              <a:rPr lang="en-US" altLang="ko-KR" sz="1400" dirty="0"/>
+              <a:t>)</a:t>
+            </a:r>
+          </a:p>
+          <a:p>
+            <a:pPr marL="742950" lvl="1" indent="-285750">
+              <a:buFont typeface="Arial" panose="020B0604020202020204" pitchFamily="34" charset="0"/>
+              <a:buChar char="•"/>
+            </a:pPr>
+            <a:r>
+              <a:rPr lang="ko-KR" altLang="en-US" sz="1400" dirty="0"/>
+              <a:t>기능의 실행 </a:t>
+            </a:r>
+            <a:r>
+              <a:rPr lang="en-US" altLang="ko-KR" sz="1400" dirty="0"/>
+              <a:t>: </a:t>
+            </a:r>
+          </a:p>
+          <a:p>
+            <a:pPr marL="1200150" lvl="2" indent="-285750">
+              <a:buFont typeface="Arial" panose="020B0604020202020204" pitchFamily="34" charset="0"/>
+              <a:buChar char="•"/>
+            </a:pPr>
+            <a:r>
+              <a:rPr lang="ko-KR" altLang="en-US" sz="1400" dirty="0"/>
+              <a:t>키 입력 시</a:t>
+            </a:r>
+            <a:r>
+              <a:rPr lang="en-US" altLang="ko-KR" sz="1400" dirty="0"/>
+              <a:t>, </a:t>
+            </a:r>
+            <a:r>
+              <a:rPr lang="ko-KR" altLang="en-US" sz="1400" dirty="0"/>
+              <a:t>현재 위치에서 바닥을 향해 즉시 이동한다</a:t>
+            </a:r>
+            <a:r>
+              <a:rPr lang="en-US" altLang="ko-KR" sz="1400" dirty="0"/>
+              <a:t>.</a:t>
+            </a:r>
+          </a:p>
+          <a:p>
+            <a:pPr marL="1200150" lvl="2" indent="-285750">
+              <a:buFont typeface="Arial" panose="020B0604020202020204" pitchFamily="34" charset="0"/>
+              <a:buChar char="•"/>
+            </a:pPr>
+            <a:r>
+              <a:rPr lang="ko-KR" altLang="en-US" sz="1400" dirty="0"/>
               <a:t>바닥 이동 중</a:t>
             </a:r>
             <a:r>
-              <a:rPr lang="en-US" altLang="ko-KR" sz="1400" dirty="0" smtClean="0"/>
+              <a:rPr lang="en-US" altLang="ko-KR" sz="1400" dirty="0"/>
               <a:t>, </a:t>
             </a:r>
             <a:r>
-              <a:rPr lang="ko-KR" altLang="en-US" sz="1400" dirty="0" smtClean="0"/>
+              <a:rPr lang="ko-KR" altLang="en-US" sz="1400" dirty="0"/>
               <a:t>어느 한 곳이라도 충돌하는 지점이 있다면 그 자리에서 멈춘다</a:t>
             </a:r>
             <a:r>
-              <a:rPr lang="en-US" altLang="ko-KR" sz="1400" dirty="0" smtClean="0"/>
+              <a:rPr lang="en-US" altLang="ko-KR" sz="1400" dirty="0"/>
               <a:t>.</a:t>
             </a:r>
           </a:p>
@@ -20669,7 +20593,7 @@
           <a:lstStyle/>
           <a:p>
             <a:r>
-              <a:rPr lang="ko-KR" altLang="en-US" smtClean="0"/>
+              <a:rPr lang="ko-KR" altLang="en-US"/>
               <a:t>기능</a:t>
             </a:r>
             <a:endParaRPr lang="ko-KR" altLang="en-US" dirty="0"/>
@@ -20703,10 +20627,10 @@
               <a:buChar char="•"/>
             </a:pPr>
             <a:r>
-              <a:rPr lang="ko-KR" altLang="en-US" dirty="0" smtClean="0"/>
+              <a:rPr lang="ko-KR" altLang="en-US" dirty="0"/>
               <a:t>라인 삭제</a:t>
             </a:r>
-            <a:endParaRPr lang="en-US" altLang="ko-KR" dirty="0" smtClean="0"/>
+            <a:endParaRPr lang="en-US" altLang="ko-KR" dirty="0"/>
           </a:p>
           <a:p>
             <a:pPr marL="742950" lvl="1" indent="-285750">
@@ -20714,23 +20638,23 @@
               <a:buChar char="•"/>
             </a:pPr>
             <a:r>
-              <a:rPr lang="en-US" altLang="ko-KR" dirty="0" smtClean="0"/>
+              <a:rPr lang="en-US" altLang="ko-KR" dirty="0"/>
               <a:t>Key </a:t>
             </a:r>
             <a:r>
-              <a:rPr lang="ko-KR" altLang="en-US" dirty="0" smtClean="0"/>
+              <a:rPr lang="ko-KR" altLang="en-US" dirty="0"/>
               <a:t>입력 </a:t>
             </a:r>
             <a:r>
-              <a:rPr lang="en-US" altLang="ko-KR" dirty="0" smtClean="0"/>
+              <a:rPr lang="en-US" altLang="ko-KR" dirty="0"/>
               <a:t>: </a:t>
             </a:r>
             <a:r>
-              <a:rPr lang="ko-KR" altLang="en-US" dirty="0" smtClean="0"/>
+              <a:rPr lang="ko-KR" altLang="en-US" dirty="0"/>
               <a:t>자동으로 진행된다</a:t>
             </a:r>
             <a:r>
-              <a:rPr lang="en-US" altLang="ko-KR" dirty="0" smtClean="0"/>
+              <a:rPr lang="en-US" altLang="ko-KR" dirty="0"/>
               <a:t>.</a:t>
             </a:r>
           </a:p>
@@ -20740,10 +20664,10 @@
               <a:buChar char="•"/>
             </a:pPr>
             <a:r>
-              <a:rPr lang="ko-KR" altLang="en-US" dirty="0" smtClean="0"/>
+              <a:rPr lang="ko-KR" altLang="en-US" dirty="0"/>
               <a:t>기능의 실행</a:t>
             </a:r>
-            <a:endParaRPr lang="en-US" altLang="ko-KR" dirty="0" smtClean="0"/>
+            <a:endParaRPr lang="en-US" altLang="ko-KR" dirty="0"/>
           </a:p>
           <a:p>
             <a:pPr marL="1200150" lvl="2" indent="-285750">
@@ -20751,19 +20675,19 @@
               <a:buChar char="•"/>
             </a:pPr>
             <a:r>
-              <a:rPr lang="ko-KR" altLang="en-US" dirty="0" smtClean="0"/>
+              <a:rPr lang="ko-KR" altLang="en-US" dirty="0"/>
               <a:t>가로 한 라인이 모두 채워졌을 경우</a:t>
             </a:r>
             <a:r>
-              <a:rPr lang="en-US" altLang="ko-KR" dirty="0" smtClean="0"/>
+              <a:rPr lang="en-US" altLang="ko-KR" dirty="0"/>
               <a:t>, </a:t>
             </a:r>
             <a:r>
-              <a:rPr lang="ko-KR" altLang="en-US" dirty="0" smtClean="0"/>
+              <a:rPr lang="ko-KR" altLang="en-US" dirty="0"/>
               <a:t>해당 라인의 블록을 모두 지운다</a:t>
             </a:r>
             <a:r>
-              <a:rPr lang="en-US" altLang="ko-KR" dirty="0" smtClean="0"/>
+              <a:rPr lang="en-US" altLang="ko-KR" dirty="0"/>
               <a:t>.</a:t>
             </a:r>
           </a:p>
@@ -20773,19 +20697,19 @@
               <a:buChar char="•"/>
             </a:pPr>
             <a:r>
-              <a:rPr lang="ko-KR" altLang="en-US" dirty="0" smtClean="0"/>
+              <a:rPr lang="ko-KR" altLang="en-US" dirty="0"/>
               <a:t>점수를 </a:t>
             </a:r>
             <a:r>
-              <a:rPr lang="en-US" altLang="ko-KR" dirty="0" smtClean="0"/>
+              <a:rPr lang="en-US" altLang="ko-KR" dirty="0"/>
               <a:t>1</a:t>
             </a:r>
             <a:r>
-              <a:rPr lang="ko-KR" altLang="en-US" dirty="0" smtClean="0"/>
+              <a:rPr lang="ko-KR" altLang="en-US" dirty="0"/>
               <a:t>점 올린다</a:t>
             </a:r>
             <a:r>
-              <a:rPr lang="en-US" altLang="ko-KR" dirty="0" smtClean="0"/>
+              <a:rPr lang="en-US" altLang="ko-KR" dirty="0"/>
               <a:t>.</a:t>
             </a:r>
           </a:p>
@@ -20795,19 +20719,19 @@
               <a:buChar char="•"/>
             </a:pPr>
             <a:r>
-              <a:rPr lang="ko-KR" altLang="en-US" dirty="0" smtClean="0"/>
+              <a:rPr lang="ko-KR" altLang="en-US" dirty="0"/>
               <a:t>목표 라인 수를 </a:t>
             </a:r>
             <a:r>
-              <a:rPr lang="en-US" altLang="ko-KR" dirty="0" smtClean="0"/>
+              <a:rPr lang="en-US" altLang="ko-KR" dirty="0"/>
               <a:t>1 </a:t>
             </a:r>
             <a:r>
-              <a:rPr lang="ko-KR" altLang="en-US" dirty="0" smtClean="0"/>
+              <a:rPr lang="ko-KR" altLang="en-US" dirty="0"/>
               <a:t>감소시킨다</a:t>
             </a:r>
             <a:r>
-              <a:rPr lang="en-US" altLang="ko-KR" dirty="0" smtClean="0"/>
+              <a:rPr lang="en-US" altLang="ko-KR" dirty="0"/>
               <a:t>.</a:t>
             </a:r>
           </a:p>
@@ -20816,7 +20740,7 @@
               <a:buFont typeface="Arial" panose="020B0604020202020204" pitchFamily="34" charset="0"/>
               <a:buChar char="•"/>
             </a:pPr>
-            <a:endParaRPr lang="en-US" altLang="ko-KR" dirty="0" smtClean="0"/>
+            <a:endParaRPr lang="en-US" altLang="ko-KR" dirty="0"/>
           </a:p>
           <a:p>
             <a:pPr marL="285750" indent="-285750">
@@ -20824,10 +20748,10 @@
               <a:buChar char="•"/>
             </a:pPr>
             <a:r>
-              <a:rPr lang="ko-KR" altLang="en-US" dirty="0" smtClean="0"/>
+              <a:rPr lang="ko-KR" altLang="en-US" dirty="0"/>
               <a:t>게임 오버</a:t>
             </a:r>
-            <a:endParaRPr lang="en-US" altLang="ko-KR" dirty="0" smtClean="0"/>
+            <a:endParaRPr lang="en-US" altLang="ko-KR" dirty="0"/>
           </a:p>
           <a:p>
             <a:pPr marL="742950" lvl="1" indent="-285750">
@@ -20835,19 +20759,19 @@
               <a:buChar char="•"/>
             </a:pPr>
             <a:r>
-              <a:rPr lang="ko-KR" altLang="en-US" dirty="0" smtClean="0"/>
+              <a:rPr lang="ko-KR" altLang="en-US" dirty="0"/>
               <a:t>키 입력 </a:t>
             </a:r>
             <a:r>
-              <a:rPr lang="en-US" altLang="ko-KR" dirty="0" smtClean="0"/>
+              <a:rPr lang="en-US" altLang="ko-KR" dirty="0"/>
               <a:t>: </a:t>
             </a:r>
             <a:r>
-              <a:rPr lang="ko-KR" altLang="en-US" dirty="0" smtClean="0"/>
+              <a:rPr lang="ko-KR" altLang="en-US" dirty="0"/>
               <a:t>자동으로 진행된다</a:t>
             </a:r>
             <a:r>
-              <a:rPr lang="en-US" altLang="ko-KR" dirty="0" smtClean="0"/>
+              <a:rPr lang="en-US" altLang="ko-KR" dirty="0"/>
               <a:t>.</a:t>
             </a:r>
           </a:p>
@@ -20857,11 +20781,11 @@
               <a:buChar char="•"/>
             </a:pPr>
             <a:r>
-              <a:rPr lang="ko-KR" altLang="en-US" dirty="0" smtClean="0"/>
+              <a:rPr lang="ko-KR" altLang="en-US" dirty="0"/>
               <a:t>기능의 실행 </a:t>
             </a:r>
             <a:r>
-              <a:rPr lang="en-US" altLang="ko-KR" dirty="0" smtClean="0"/>
+              <a:rPr lang="en-US" altLang="ko-KR" dirty="0"/>
               <a:t>: </a:t>
             </a:r>
           </a:p>
@@ -20871,35 +20795,35 @@
               <a:buChar char="•"/>
             </a:pPr>
             <a:r>
-              <a:rPr lang="ko-KR" altLang="en-US" dirty="0" smtClean="0"/>
+              <a:rPr lang="ko-KR" altLang="en-US" dirty="0"/>
               <a:t>블록이 지정된 최고점</a:t>
             </a:r>
             <a:r>
-              <a:rPr lang="en-US" altLang="ko-KR" dirty="0" smtClean="0"/>
+              <a:rPr lang="en-US" altLang="ko-KR" dirty="0"/>
               <a:t>(20</a:t>
             </a:r>
             <a:r>
-              <a:rPr lang="ko-KR" altLang="en-US" dirty="0" smtClean="0"/>
+              <a:rPr lang="ko-KR" altLang="en-US" dirty="0"/>
               <a:t>번 라인</a:t>
             </a:r>
             <a:r>
-              <a:rPr lang="en-US" altLang="ko-KR" dirty="0" smtClean="0"/>
+              <a:rPr lang="en-US" altLang="ko-KR" dirty="0"/>
               <a:t>)</a:t>
             </a:r>
             <a:r>
-              <a:rPr lang="ko-KR" altLang="en-US" dirty="0" smtClean="0"/>
+              <a:rPr lang="ko-KR" altLang="en-US" dirty="0"/>
               <a:t>에 도달했을 경우</a:t>
             </a:r>
             <a:r>
-              <a:rPr lang="en-US" altLang="ko-KR" dirty="0" smtClean="0"/>
+              <a:rPr lang="en-US" altLang="ko-KR" dirty="0"/>
               <a:t>, </a:t>
             </a:r>
             <a:r>
-              <a:rPr lang="ko-KR" altLang="en-US" dirty="0" smtClean="0"/>
+              <a:rPr lang="ko-KR" altLang="en-US" dirty="0"/>
               <a:t>게임 오버가 된다</a:t>
             </a:r>
             <a:r>
-              <a:rPr lang="en-US" altLang="ko-KR" dirty="0" smtClean="0"/>
+              <a:rPr lang="en-US" altLang="ko-KR" dirty="0"/>
               <a:t>.</a:t>
             </a:r>
           </a:p>
@@ -20909,11 +20833,11 @@
               <a:buChar char="•"/>
             </a:pPr>
             <a:r>
-              <a:rPr lang="ko-KR" altLang="en-US" dirty="0" smtClean="0"/>
+              <a:rPr lang="ko-KR" altLang="en-US" dirty="0"/>
               <a:t>가장 아래쪽 줄부터 회색으로 변한다</a:t>
             </a:r>
             <a:r>
-              <a:rPr lang="en-US" altLang="ko-KR" dirty="0" smtClean="0"/>
+              <a:rPr lang="en-US" altLang="ko-KR" dirty="0"/>
               <a:t>. (Optional)</a:t>
             </a:r>
           </a:p>
@@ -20923,27 +20847,27 @@
               <a:buChar char="•"/>
             </a:pPr>
             <a:r>
-              <a:rPr lang="ko-KR" altLang="en-US" dirty="0" smtClean="0"/>
+              <a:rPr lang="ko-KR" altLang="en-US" dirty="0"/>
               <a:t>화면에 게임 오버 문자</a:t>
             </a:r>
             <a:r>
-              <a:rPr lang="en-US" altLang="ko-KR" dirty="0" smtClean="0"/>
+              <a:rPr lang="en-US" altLang="ko-KR" dirty="0"/>
               <a:t>(</a:t>
             </a:r>
             <a:r>
-              <a:rPr lang="ko-KR" altLang="en-US" dirty="0" smtClean="0"/>
+              <a:rPr lang="ko-KR" altLang="en-US" dirty="0"/>
               <a:t>이미지</a:t>
             </a:r>
             <a:r>
-              <a:rPr lang="en-US" altLang="ko-KR" dirty="0" smtClean="0"/>
+              <a:rPr lang="en-US" altLang="ko-KR" dirty="0"/>
               <a:t>)</a:t>
             </a:r>
             <a:r>
-              <a:rPr lang="ko-KR" altLang="en-US" dirty="0" smtClean="0"/>
+              <a:rPr lang="ko-KR" altLang="en-US" dirty="0"/>
               <a:t>를 출력한다</a:t>
             </a:r>
             <a:r>
-              <a:rPr lang="en-US" altLang="ko-KR" dirty="0" smtClean="0"/>
+              <a:rPr lang="en-US" altLang="ko-KR" dirty="0"/>
               <a:t>.</a:t>
             </a:r>
           </a:p>
@@ -20953,27 +20877,27 @@
               <a:buChar char="•"/>
             </a:pPr>
             <a:r>
-              <a:rPr lang="ko-KR" altLang="en-US" dirty="0" smtClean="0"/>
+              <a:rPr lang="ko-KR" altLang="en-US" dirty="0"/>
               <a:t>일정 시간 </a:t>
             </a:r>
             <a:r>
-              <a:rPr lang="en-US" altLang="ko-KR" dirty="0" smtClean="0"/>
+              <a:rPr lang="en-US" altLang="ko-KR" dirty="0"/>
               <a:t>(3</a:t>
             </a:r>
             <a:r>
-              <a:rPr lang="ko-KR" altLang="en-US" dirty="0" smtClean="0"/>
+              <a:rPr lang="ko-KR" altLang="en-US" dirty="0"/>
               <a:t>초</a:t>
             </a:r>
             <a:r>
-              <a:rPr lang="en-US" altLang="ko-KR" dirty="0" smtClean="0"/>
+              <a:rPr lang="en-US" altLang="ko-KR" dirty="0"/>
               <a:t>) </a:t>
             </a:r>
             <a:r>
-              <a:rPr lang="ko-KR" altLang="en-US" dirty="0" smtClean="0"/>
+              <a:rPr lang="ko-KR" altLang="en-US" dirty="0"/>
               <a:t>대기 후 스코어 화면으로 이동한다</a:t>
             </a:r>
             <a:r>
-              <a:rPr lang="en-US" altLang="ko-KR" dirty="0" smtClean="0"/>
+              <a:rPr lang="en-US" altLang="ko-KR" dirty="0"/>
               <a:t>.</a:t>
             </a:r>
           </a:p>
@@ -20982,7 +20906,7 @@
               <a:buFont typeface="Arial" panose="020B0604020202020204" pitchFamily="34" charset="0"/>
               <a:buChar char="•"/>
             </a:pPr>
-            <a:endParaRPr lang="en-US" altLang="ko-KR" dirty="0" smtClean="0"/>
+            <a:endParaRPr lang="en-US" altLang="ko-KR" dirty="0"/>
           </a:p>
         </p:txBody>
       </p:sp>
@@ -22354,11 +22278,11 @@
           <a:lstStyle/>
           <a:p>
             <a:r>
-              <a:rPr lang="ko-KR" altLang="en-US" dirty="0" smtClean="0"/>
+              <a:rPr lang="ko-KR" altLang="en-US" dirty="0"/>
               <a:t>회전되는 </a:t>
             </a:r>
             <a:r>
-              <a:rPr lang="ko-KR" altLang="en-US" dirty="0" err="1" smtClean="0"/>
+              <a:rPr lang="ko-KR" altLang="en-US" dirty="0" err="1"/>
               <a:t>블럭</a:t>
             </a:r>
             <a:endParaRPr lang="ko-KR" altLang="en-US" dirty="0"/>
@@ -22388,11 +22312,11 @@
           <a:lstStyle/>
           <a:p>
             <a:r>
-              <a:rPr lang="ko-KR" altLang="en-US" smtClean="0"/>
+              <a:rPr lang="ko-KR" altLang="en-US"/>
               <a:t>회전의 중심 </a:t>
             </a:r>
             <a:r>
-              <a:rPr lang="ko-KR" altLang="en-US" dirty="0" err="1" smtClean="0"/>
+              <a:rPr lang="ko-KR" altLang="en-US" dirty="0" err="1"/>
               <a:t>블럭</a:t>
             </a:r>
             <a:endParaRPr lang="ko-KR" altLang="en-US" dirty="0"/>
@@ -22462,7 +22386,7 @@
           <a:lstStyle/>
           <a:p>
             <a:r>
-              <a:rPr lang="en-US" altLang="ko-KR" dirty="0" smtClean="0"/>
+              <a:rPr lang="en-US" altLang="ko-KR" dirty="0"/>
               <a:t>30 * 30</a:t>
             </a:r>
             <a:endParaRPr lang="ko-KR" altLang="en-US" dirty="0"/>
@@ -22522,7 +22446,7 @@
           <a:lstStyle/>
           <a:p>
             <a:r>
-              <a:rPr lang="ko-KR" altLang="en-US" smtClean="0"/>
+              <a:rPr lang="ko-KR" altLang="en-US"/>
               <a:t>기능</a:t>
             </a:r>
             <a:endParaRPr lang="ko-KR" altLang="en-US" dirty="0"/>
@@ -22556,14 +22480,14 @@
               <a:buChar char="•"/>
             </a:pPr>
             <a:r>
-              <a:rPr lang="ko-KR" altLang="en-US" dirty="0" err="1" smtClean="0"/>
+              <a:rPr lang="ko-KR" altLang="en-US" dirty="0" err="1"/>
               <a:t>고스트</a:t>
             </a:r>
             <a:r>
-              <a:rPr lang="ko-KR" altLang="en-US" dirty="0" smtClean="0"/>
+              <a:rPr lang="ko-KR" altLang="en-US" dirty="0"/>
               <a:t> 블록</a:t>
             </a:r>
-            <a:endParaRPr lang="en-US" altLang="ko-KR" dirty="0" smtClean="0"/>
+            <a:endParaRPr lang="en-US" altLang="ko-KR" dirty="0"/>
           </a:p>
           <a:p>
             <a:pPr marL="742950" lvl="1" indent="-285750">
@@ -22571,11 +22495,11 @@
               <a:buChar char="•"/>
             </a:pPr>
             <a:r>
-              <a:rPr lang="ko-KR" altLang="en-US" dirty="0" smtClean="0"/>
+              <a:rPr lang="ko-KR" altLang="en-US" dirty="0"/>
               <a:t>유저의 블록이 낙하 하게 될 위치에 미리 보여지는 블록</a:t>
             </a:r>
             <a:r>
-              <a:rPr lang="en-US" altLang="ko-KR" dirty="0" smtClean="0"/>
+              <a:rPr lang="en-US" altLang="ko-KR" dirty="0"/>
               <a:t>.</a:t>
             </a:r>
           </a:p>
@@ -22585,35 +22509,35 @@
               <a:buChar char="•"/>
             </a:pPr>
             <a:r>
-              <a:rPr lang="ko-KR" altLang="en-US" dirty="0" smtClean="0"/>
+              <a:rPr lang="ko-KR" altLang="en-US" dirty="0"/>
               <a:t>유저의 블록이 낙하하면 사라진다</a:t>
             </a:r>
             <a:r>
-              <a:rPr lang="en-US" altLang="ko-KR" dirty="0" smtClean="0"/>
+              <a:rPr lang="en-US" altLang="ko-KR" dirty="0"/>
               <a:t>. (</a:t>
             </a:r>
             <a:r>
-              <a:rPr lang="ko-KR" altLang="en-US" dirty="0" smtClean="0"/>
+              <a:rPr lang="ko-KR" altLang="en-US" dirty="0"/>
               <a:t>낙하 시</a:t>
             </a:r>
             <a:r>
-              <a:rPr lang="en-US" altLang="ko-KR" dirty="0" smtClean="0"/>
+              <a:rPr lang="en-US" altLang="ko-KR" dirty="0"/>
               <a:t>, </a:t>
             </a:r>
             <a:r>
-              <a:rPr lang="ko-KR" altLang="en-US" dirty="0" smtClean="0"/>
+              <a:rPr lang="ko-KR" altLang="en-US" dirty="0"/>
               <a:t>유저 블록이 </a:t>
             </a:r>
             <a:r>
-              <a:rPr lang="ko-KR" altLang="en-US" dirty="0" err="1" smtClean="0"/>
+              <a:rPr lang="ko-KR" altLang="en-US" dirty="0" err="1"/>
               <a:t>고스트</a:t>
             </a:r>
             <a:r>
-              <a:rPr lang="ko-KR" altLang="en-US" dirty="0" smtClean="0"/>
+              <a:rPr lang="ko-KR" altLang="en-US" dirty="0"/>
               <a:t> 블록의 위에 오도록 한다</a:t>
             </a:r>
             <a:r>
-              <a:rPr lang="en-US" altLang="ko-KR" dirty="0" smtClean="0"/>
+              <a:rPr lang="en-US" altLang="ko-KR" dirty="0"/>
               <a:t>.</a:t>
             </a:r>
           </a:p>
@@ -23987,11 +23911,11 @@
           <a:lstStyle/>
           <a:p>
             <a:r>
-              <a:rPr lang="ko-KR" altLang="en-US" dirty="0" smtClean="0"/>
+              <a:rPr lang="ko-KR" altLang="en-US" dirty="0"/>
               <a:t>회전되는 </a:t>
             </a:r>
             <a:r>
-              <a:rPr lang="ko-KR" altLang="en-US" dirty="0" err="1" smtClean="0"/>
+              <a:rPr lang="ko-KR" altLang="en-US" dirty="0" err="1"/>
               <a:t>블럭</a:t>
             </a:r>
             <a:endParaRPr lang="ko-KR" altLang="en-US" dirty="0"/>
@@ -24021,11 +23945,11 @@
           <a:lstStyle/>
           <a:p>
             <a:r>
-              <a:rPr lang="ko-KR" altLang="en-US" smtClean="0"/>
+              <a:rPr lang="ko-KR" altLang="en-US"/>
               <a:t>회전의 중심 </a:t>
             </a:r>
             <a:r>
-              <a:rPr lang="ko-KR" altLang="en-US" dirty="0" err="1" smtClean="0"/>
+              <a:rPr lang="ko-KR" altLang="en-US" dirty="0" err="1"/>
               <a:t>블럭</a:t>
             </a:r>
             <a:endParaRPr lang="ko-KR" altLang="en-US" dirty="0"/>
@@ -24095,7 +24019,7 @@
           <a:lstStyle/>
           <a:p>
             <a:r>
-              <a:rPr lang="en-US" altLang="ko-KR" dirty="0" smtClean="0"/>
+              <a:rPr lang="en-US" altLang="ko-KR" dirty="0"/>
               <a:t>30 * 30</a:t>
             </a:r>
             <a:endParaRPr lang="ko-KR" altLang="en-US" dirty="0"/>
@@ -24155,10 +24079,9 @@
           <a:lstStyle/>
           <a:p>
             <a:r>
-              <a:rPr lang="ko-KR" altLang="en-US" dirty="0" smtClean="0"/>
+              <a:rPr lang="ko-KR" altLang="en-US" dirty="0"/>
               <a:t>블록</a:t>
             </a:r>
-            <a:endParaRPr lang="ko-KR" altLang="en-US" dirty="0"/>
           </a:p>
         </p:txBody>
       </p:sp>
@@ -24189,19 +24112,19 @@
               <a:buChar char="•"/>
             </a:pPr>
             <a:r>
-              <a:rPr lang="ko-KR" altLang="en-US" dirty="0" smtClean="0"/>
+              <a:rPr lang="ko-KR" altLang="en-US" dirty="0"/>
               <a:t>블록</a:t>
             </a:r>
             <a:r>
-              <a:rPr lang="en-US" altLang="ko-KR" dirty="0" smtClean="0"/>
+              <a:rPr lang="en-US" altLang="ko-KR" dirty="0"/>
               <a:t> </a:t>
             </a:r>
             <a:r>
-              <a:rPr lang="ko-KR" altLang="en-US" dirty="0" smtClean="0"/>
+              <a:rPr lang="ko-KR" altLang="en-US" dirty="0"/>
               <a:t>클래스를 중심으로 블록을 생성한다</a:t>
             </a:r>
             <a:r>
-              <a:rPr lang="en-US" altLang="ko-KR" dirty="0" smtClean="0"/>
+              <a:rPr lang="en-US" altLang="ko-KR" dirty="0"/>
               <a:t>.</a:t>
             </a:r>
           </a:p>
@@ -24211,46 +24134,45 @@
               <a:buChar char="•"/>
             </a:pPr>
             <a:r>
-              <a:rPr lang="ko-KR" altLang="en-US" dirty="0" smtClean="0"/>
+              <a:rPr lang="ko-KR" altLang="en-US" dirty="0"/>
               <a:t>블록 클래스에서 블록의 모양</a:t>
             </a:r>
             <a:r>
-              <a:rPr lang="en-US" altLang="ko-KR" dirty="0" smtClean="0"/>
+              <a:rPr lang="en-US" altLang="ko-KR" dirty="0"/>
               <a:t>, </a:t>
             </a:r>
             <a:r>
-              <a:rPr lang="ko-KR" altLang="en-US" dirty="0" smtClean="0"/>
+              <a:rPr lang="ko-KR" altLang="en-US" dirty="0"/>
               <a:t>회전</a:t>
             </a:r>
             <a:r>
-              <a:rPr lang="en-US" altLang="ko-KR" dirty="0" smtClean="0"/>
+              <a:rPr lang="en-US" altLang="ko-KR" dirty="0"/>
               <a:t>, </a:t>
             </a:r>
             <a:r>
-              <a:rPr lang="ko-KR" altLang="en-US" dirty="0" smtClean="0"/>
+              <a:rPr lang="ko-KR" altLang="en-US" dirty="0"/>
               <a:t>이동</a:t>
             </a:r>
             <a:r>
-              <a:rPr lang="en-US" altLang="ko-KR" dirty="0" smtClean="0"/>
+              <a:rPr lang="en-US" altLang="ko-KR" dirty="0"/>
               <a:t>, </a:t>
             </a:r>
             <a:r>
-              <a:rPr lang="ko-KR" altLang="en-US" dirty="0" smtClean="0"/>
+              <a:rPr lang="ko-KR" altLang="en-US" dirty="0"/>
               <a:t>충돌을 검사</a:t>
             </a:r>
             <a:r>
-              <a:rPr lang="en-US" altLang="ko-KR" dirty="0" smtClean="0"/>
+              <a:rPr lang="en-US" altLang="ko-KR" dirty="0"/>
               <a:t>/</a:t>
             </a:r>
             <a:r>
-              <a:rPr lang="ko-KR" altLang="en-US" dirty="0" smtClean="0"/>
+              <a:rPr lang="ko-KR" altLang="en-US" dirty="0"/>
               <a:t>적용 한다</a:t>
             </a:r>
             <a:r>
-              <a:rPr lang="en-US" altLang="ko-KR" dirty="0" smtClean="0"/>
+              <a:rPr lang="en-US" altLang="ko-KR" dirty="0"/>
               <a:t>.</a:t>
             </a:r>
-            <a:endParaRPr lang="en-US" altLang="ko-KR" dirty="0"/>
           </a:p>
         </p:txBody>
       </p:sp>
@@ -25631,11 +25553,11 @@
           <a:lstStyle/>
           <a:p>
             <a:r>
-              <a:rPr lang="ko-KR" altLang="en-US" dirty="0" smtClean="0"/>
+              <a:rPr lang="ko-KR" altLang="en-US" dirty="0"/>
               <a:t>회전되는 </a:t>
             </a:r>
             <a:r>
-              <a:rPr lang="ko-KR" altLang="en-US" dirty="0" err="1" smtClean="0"/>
+              <a:rPr lang="ko-KR" altLang="en-US" dirty="0" err="1"/>
               <a:t>블럭</a:t>
             </a:r>
             <a:endParaRPr lang="ko-KR" altLang="en-US" dirty="0"/>
@@ -25665,11 +25587,11 @@
           <a:lstStyle/>
           <a:p>
             <a:r>
-              <a:rPr lang="ko-KR" altLang="en-US" smtClean="0"/>
+              <a:rPr lang="ko-KR" altLang="en-US"/>
               <a:t>회전의 중심 </a:t>
             </a:r>
             <a:r>
-              <a:rPr lang="ko-KR" altLang="en-US" dirty="0" err="1" smtClean="0"/>
+              <a:rPr lang="ko-KR" altLang="en-US" dirty="0" err="1"/>
               <a:t>블럭</a:t>
             </a:r>
             <a:endParaRPr lang="ko-KR" altLang="en-US" dirty="0"/>
@@ -25739,7 +25661,7 @@
           <a:lstStyle/>
           <a:p>
             <a:r>
-              <a:rPr lang="en-US" altLang="ko-KR" dirty="0" smtClean="0"/>
+              <a:rPr lang="en-US" altLang="ko-KR" dirty="0"/>
               <a:t>30 * 30</a:t>
             </a:r>
             <a:endParaRPr lang="ko-KR" altLang="en-US" dirty="0"/>

</xml_diff>